<commit_message>
Changed Portfolio and Presentation
</commit_message>
<xml_diff>
--- a/Abgabe/Dokumentation/Präsentation.pptx
+++ b/Abgabe/Dokumentation/Präsentation.pptx
@@ -11966,13 +11966,8 @@
           <a:p>
             <a:r>
               <a:rPr lang="de-DE" dirty="0"/>
-              <a:t>5. </a:t>
+              <a:t>5. Qualitätssicherung</a:t>
             </a:r>
-            <a:r>
-              <a:rPr lang="de-DE" dirty="0" err="1"/>
-              <a:t>Qualitätsicherung</a:t>
-            </a:r>
-            <a:endParaRPr lang="de-DE" dirty="0"/>
           </a:p>
         </p:txBody>
       </p:sp>
@@ -15801,6 +15796,87 @@
           </a:prstGeom>
         </p:spPr>
       </p:pic>
+      <p:sp>
+        <p:nvSpPr>
+          <p:cNvPr id="8" name="Textfeld 7">
+            <a:extLst>
+              <a:ext uri="{FF2B5EF4-FFF2-40B4-BE49-F238E27FC236}">
+                <a16:creationId xmlns:a16="http://schemas.microsoft.com/office/drawing/2014/main" id="{8AE8F1D4-FBF1-A359-050A-F497A7F6C624}"/>
+              </a:ext>
+            </a:extLst>
+          </p:cNvPr>
+          <p:cNvSpPr txBox="1"/>
+          <p:nvPr/>
+        </p:nvSpPr>
+        <p:spPr>
+          <a:xfrm>
+            <a:off x="798787" y="2606782"/>
+            <a:ext cx="5475890" cy="2952027"/>
+          </a:xfrm>
+          <a:prstGeom prst="rect">
+            <a:avLst/>
+          </a:prstGeom>
+          <a:noFill/>
+        </p:spPr>
+        <p:txBody>
+          <a:bodyPr wrap="square" rtlCol="0">
+            <a:spAutoFit/>
+          </a:bodyPr>
+          <a:lstStyle/>
+          <a:p>
+            <a:pPr marL="285750" indent="-285750">
+              <a:lnSpc>
+                <a:spcPct val="150000"/>
+              </a:lnSpc>
+              <a:buFont typeface="Arial" panose="020B0604020202020204" pitchFamily="34" charset="0"/>
+              <a:buChar char="•"/>
+            </a:pPr>
+            <a:r>
+              <a:rPr lang="de-DE" dirty="0"/>
+              <a:t>Product-Backlog wurde basierend auf den Stakeholdern rechts erstellt.</a:t>
+            </a:r>
+          </a:p>
+          <a:p>
+            <a:pPr marL="285750" indent="-285750">
+              <a:lnSpc>
+                <a:spcPct val="150000"/>
+              </a:lnSpc>
+              <a:buFont typeface="Arial" panose="020B0604020202020204" pitchFamily="34" charset="0"/>
+              <a:buChar char="•"/>
+            </a:pPr>
+            <a:r>
+              <a:rPr lang="de-DE" dirty="0"/>
+              <a:t>Diese wurden befragt, ihre Geschichten wurden als User Storys aufgenommen</a:t>
+            </a:r>
+          </a:p>
+          <a:p>
+            <a:pPr marL="285750" indent="-285750">
+              <a:lnSpc>
+                <a:spcPct val="150000"/>
+              </a:lnSpc>
+              <a:buFont typeface="Arial" panose="020B0604020202020204" pitchFamily="34" charset="0"/>
+              <a:buChar char="•"/>
+            </a:pPr>
+            <a:r>
+              <a:rPr lang="de-DE" dirty="0"/>
+              <a:t>Diese User Storys stellen die Anforderungen dar.</a:t>
+            </a:r>
+          </a:p>
+          <a:p>
+            <a:pPr marL="285750" indent="-285750">
+              <a:lnSpc>
+                <a:spcPct val="150000"/>
+              </a:lnSpc>
+              <a:buFont typeface="Arial" panose="020B0604020202020204" pitchFamily="34" charset="0"/>
+              <a:buChar char="•"/>
+            </a:pPr>
+            <a:r>
+              <a:rPr lang="de-DE" dirty="0"/>
+              <a:t>Zusätzlich zu den User-Storys wurden Anforderungen aus dem Auftrag entnommen.</a:t>
+            </a:r>
+          </a:p>
+        </p:txBody>
+      </p:sp>
     </p:spTree>
     <p:extLst>
       <p:ext uri="{BB962C8B-B14F-4D97-AF65-F5344CB8AC3E}">

</xml_diff>

<commit_message>
Added Kommunikation and Schulung to PowerPoint
</commit_message>
<xml_diff>
--- a/Abgabe/Dokumentation/Präsentation.pptx
+++ b/Abgabe/Dokumentation/Präsentation.pptx
@@ -21,14 +21,15 @@
     <p:sldId id="273" r:id="rId15"/>
     <p:sldId id="274" r:id="rId16"/>
     <p:sldId id="283" r:id="rId17"/>
-    <p:sldId id="276" r:id="rId18"/>
-    <p:sldId id="277" r:id="rId19"/>
-    <p:sldId id="278" r:id="rId20"/>
-    <p:sldId id="284" r:id="rId21"/>
-    <p:sldId id="279" r:id="rId22"/>
-    <p:sldId id="275" r:id="rId23"/>
-    <p:sldId id="280" r:id="rId24"/>
-    <p:sldId id="281" r:id="rId25"/>
+    <p:sldId id="287" r:id="rId18"/>
+    <p:sldId id="276" r:id="rId19"/>
+    <p:sldId id="277" r:id="rId20"/>
+    <p:sldId id="278" r:id="rId21"/>
+    <p:sldId id="284" r:id="rId22"/>
+    <p:sldId id="279" r:id="rId23"/>
+    <p:sldId id="275" r:id="rId24"/>
+    <p:sldId id="280" r:id="rId25"/>
+    <p:sldId id="281" r:id="rId26"/>
   </p:sldIdLst>
   <p:sldSz cx="12192000" cy="6858000"/>
   <p:notesSz cx="7559675" cy="10691813"/>
@@ -14940,6 +14941,1290 @@
           </a:p>
         </p:txBody>
       </p:sp>
+      <p:graphicFrame>
+        <p:nvGraphicFramePr>
+          <p:cNvPr id="6" name="Tabelle 5">
+            <a:extLst>
+              <a:ext uri="{FF2B5EF4-FFF2-40B4-BE49-F238E27FC236}">
+                <a16:creationId xmlns:a16="http://schemas.microsoft.com/office/drawing/2014/main" id="{41F8A205-8853-9C90-FA6C-DB8D3E517E3E}"/>
+              </a:ext>
+            </a:extLst>
+          </p:cNvPr>
+          <p:cNvGraphicFramePr>
+            <a:graphicFrameLocks noGrp="1"/>
+          </p:cNvGraphicFramePr>
+          <p:nvPr>
+            <p:extLst>
+              <p:ext uri="{D42A27DB-BD31-4B8C-83A1-F6EECF244321}">
+                <p14:modId xmlns:p14="http://schemas.microsoft.com/office/powerpoint/2010/main" val="1152101363"/>
+              </p:ext>
+            </p:extLst>
+          </p:nvPr>
+        </p:nvGraphicFramePr>
+        <p:xfrm>
+          <a:off x="800520" y="1696453"/>
+          <a:ext cx="10590960" cy="4247147"/>
+        </p:xfrm>
+        <a:graphic>
+          <a:graphicData uri="http://schemas.openxmlformats.org/drawingml/2006/table">
+            <a:tbl>
+              <a:tblPr firstRow="1" bandRow="1">
+                <a:tableStyleId>{5C22544A-7EE6-4342-B048-85BDC9FD1C3A}</a:tableStyleId>
+              </a:tblPr>
+              <a:tblGrid>
+                <a:gridCol w="2118192">
+                  <a:extLst>
+                    <a:ext uri="{9D8B030D-6E8A-4147-A177-3AD203B41FA5}">
+                      <a16:colId xmlns:a16="http://schemas.microsoft.com/office/drawing/2014/main" val="3376875387"/>
+                    </a:ext>
+                  </a:extLst>
+                </a:gridCol>
+                <a:gridCol w="2118192">
+                  <a:extLst>
+                    <a:ext uri="{9D8B030D-6E8A-4147-A177-3AD203B41FA5}">
+                      <a16:colId xmlns:a16="http://schemas.microsoft.com/office/drawing/2014/main" val="805869292"/>
+                    </a:ext>
+                  </a:extLst>
+                </a:gridCol>
+                <a:gridCol w="2118192">
+                  <a:extLst>
+                    <a:ext uri="{9D8B030D-6E8A-4147-A177-3AD203B41FA5}">
+                      <a16:colId xmlns:a16="http://schemas.microsoft.com/office/drawing/2014/main" val="2207912060"/>
+                    </a:ext>
+                  </a:extLst>
+                </a:gridCol>
+                <a:gridCol w="2118192">
+                  <a:extLst>
+                    <a:ext uri="{9D8B030D-6E8A-4147-A177-3AD203B41FA5}">
+                      <a16:colId xmlns:a16="http://schemas.microsoft.com/office/drawing/2014/main" val="2071083249"/>
+                    </a:ext>
+                  </a:extLst>
+                </a:gridCol>
+                <a:gridCol w="2118192">
+                  <a:extLst>
+                    <a:ext uri="{9D8B030D-6E8A-4147-A177-3AD203B41FA5}">
+                      <a16:colId xmlns:a16="http://schemas.microsoft.com/office/drawing/2014/main" val="114430656"/>
+                    </a:ext>
+                  </a:extLst>
+                </a:gridCol>
+              </a:tblGrid>
+              <a:tr h="440909">
+                <a:tc>
+                  <a:txBody>
+                    <a:bodyPr/>
+                    <a:lstStyle/>
+                    <a:p>
+                      <a:pPr>
+                        <a:lnSpc>
+                          <a:spcPct val="150000"/>
+                        </a:lnSpc>
+                        <a:spcAft>
+                          <a:spcPts val="600"/>
+                        </a:spcAft>
+                        <a:buNone/>
+                      </a:pPr>
+                      <a:r>
+                        <a:rPr lang="de-DE" sz="1000" b="1" kern="100" dirty="0">
+                          <a:effectLst/>
+                          <a:latin typeface="Arial" panose="020B0604020202020204" pitchFamily="34" charset="0"/>
+                          <a:ea typeface="Noto Serif CJK SC"/>
+                          <a:cs typeface="Arial" panose="020B0604020202020204" pitchFamily="34" charset="0"/>
+                        </a:rPr>
+                        <a:t>Stakeholder</a:t>
+                      </a:r>
+                      <a:endParaRPr lang="de-DE" sz="1200" kern="100" dirty="0">
+                        <a:effectLst/>
+                        <a:latin typeface="Arial" panose="020B0604020202020204" pitchFamily="34" charset="0"/>
+                        <a:ea typeface="Noto Serif CJK SC"/>
+                        <a:cs typeface="Noto Sans Devanagari" panose="020B0502040504020204" pitchFamily="34" charset="0"/>
+                      </a:endParaRPr>
+                    </a:p>
+                  </a:txBody>
+                  <a:tcPr marL="68580" marR="68580" marT="0" marB="0"/>
+                </a:tc>
+                <a:tc>
+                  <a:txBody>
+                    <a:bodyPr/>
+                    <a:lstStyle/>
+                    <a:p>
+                      <a:pPr>
+                        <a:lnSpc>
+                          <a:spcPct val="150000"/>
+                        </a:lnSpc>
+                        <a:spcAft>
+                          <a:spcPts val="600"/>
+                        </a:spcAft>
+                        <a:buNone/>
+                      </a:pPr>
+                      <a:r>
+                        <a:rPr lang="de-DE" sz="1000" b="1" kern="100">
+                          <a:effectLst/>
+                          <a:latin typeface="Arial" panose="020B0604020202020204" pitchFamily="34" charset="0"/>
+                          <a:ea typeface="Noto Serif CJK SC"/>
+                          <a:cs typeface="Arial" panose="020B0604020202020204" pitchFamily="34" charset="0"/>
+                        </a:rPr>
+                        <a:t>Was wird kommuniziert?</a:t>
+                      </a:r>
+                      <a:endParaRPr lang="de-DE" sz="1200" kern="100">
+                        <a:effectLst/>
+                        <a:latin typeface="Arial" panose="020B0604020202020204" pitchFamily="34" charset="0"/>
+                        <a:ea typeface="Noto Serif CJK SC"/>
+                        <a:cs typeface="Noto Sans Devanagari" panose="020B0502040504020204" pitchFamily="34" charset="0"/>
+                      </a:endParaRPr>
+                    </a:p>
+                  </a:txBody>
+                  <a:tcPr marL="68580" marR="68580" marT="0" marB="0"/>
+                </a:tc>
+                <a:tc>
+                  <a:txBody>
+                    <a:bodyPr/>
+                    <a:lstStyle/>
+                    <a:p>
+                      <a:pPr>
+                        <a:lnSpc>
+                          <a:spcPct val="150000"/>
+                        </a:lnSpc>
+                        <a:spcAft>
+                          <a:spcPts val="600"/>
+                        </a:spcAft>
+                        <a:buNone/>
+                      </a:pPr>
+                      <a:r>
+                        <a:rPr lang="de-DE" sz="1000" b="1" kern="100">
+                          <a:effectLst/>
+                          <a:latin typeface="Arial" panose="020B0604020202020204" pitchFamily="34" charset="0"/>
+                          <a:ea typeface="Noto Serif CJK SC"/>
+                          <a:cs typeface="Arial" panose="020B0604020202020204" pitchFamily="34" charset="0"/>
+                        </a:rPr>
+                        <a:t>Häufigkeit</a:t>
+                      </a:r>
+                      <a:endParaRPr lang="de-DE" sz="1200" kern="100">
+                        <a:effectLst/>
+                        <a:latin typeface="Arial" panose="020B0604020202020204" pitchFamily="34" charset="0"/>
+                        <a:ea typeface="Noto Serif CJK SC"/>
+                        <a:cs typeface="Noto Sans Devanagari" panose="020B0502040504020204" pitchFamily="34" charset="0"/>
+                      </a:endParaRPr>
+                    </a:p>
+                  </a:txBody>
+                  <a:tcPr marL="68580" marR="68580" marT="0" marB="0"/>
+                </a:tc>
+                <a:tc>
+                  <a:txBody>
+                    <a:bodyPr/>
+                    <a:lstStyle/>
+                    <a:p>
+                      <a:pPr>
+                        <a:lnSpc>
+                          <a:spcPct val="150000"/>
+                        </a:lnSpc>
+                        <a:spcAft>
+                          <a:spcPts val="600"/>
+                        </a:spcAft>
+                        <a:buNone/>
+                      </a:pPr>
+                      <a:r>
+                        <a:rPr lang="de-DE" sz="1000" b="1" kern="100">
+                          <a:effectLst/>
+                          <a:latin typeface="Arial" panose="020B0604020202020204" pitchFamily="34" charset="0"/>
+                          <a:ea typeface="Noto Serif CJK SC"/>
+                          <a:cs typeface="Arial" panose="020B0604020202020204" pitchFamily="34" charset="0"/>
+                        </a:rPr>
+                        <a:t>Wie wird kommuniziert?</a:t>
+                      </a:r>
+                      <a:endParaRPr lang="de-DE" sz="1200" kern="100">
+                        <a:effectLst/>
+                        <a:latin typeface="Arial" panose="020B0604020202020204" pitchFamily="34" charset="0"/>
+                        <a:ea typeface="Noto Serif CJK SC"/>
+                        <a:cs typeface="Noto Sans Devanagari" panose="020B0502040504020204" pitchFamily="34" charset="0"/>
+                      </a:endParaRPr>
+                    </a:p>
+                  </a:txBody>
+                  <a:tcPr marL="68580" marR="68580" marT="0" marB="0"/>
+                </a:tc>
+                <a:tc>
+                  <a:txBody>
+                    <a:bodyPr/>
+                    <a:lstStyle/>
+                    <a:p>
+                      <a:pPr>
+                        <a:lnSpc>
+                          <a:spcPct val="150000"/>
+                        </a:lnSpc>
+                        <a:spcAft>
+                          <a:spcPts val="600"/>
+                        </a:spcAft>
+                        <a:buNone/>
+                      </a:pPr>
+                      <a:r>
+                        <a:rPr lang="de-DE" sz="1000" b="1" kern="100">
+                          <a:effectLst/>
+                          <a:latin typeface="Arial" panose="020B0604020202020204" pitchFamily="34" charset="0"/>
+                          <a:ea typeface="Noto Serif CJK SC"/>
+                          <a:cs typeface="Arial" panose="020B0604020202020204" pitchFamily="34" charset="0"/>
+                        </a:rPr>
+                        <a:t>Verantwortlicher</a:t>
+                      </a:r>
+                      <a:endParaRPr lang="de-DE" sz="1200" kern="100">
+                        <a:effectLst/>
+                        <a:latin typeface="Arial" panose="020B0604020202020204" pitchFamily="34" charset="0"/>
+                        <a:ea typeface="Noto Serif CJK SC"/>
+                        <a:cs typeface="Noto Sans Devanagari" panose="020B0502040504020204" pitchFamily="34" charset="0"/>
+                      </a:endParaRPr>
+                    </a:p>
+                  </a:txBody>
+                  <a:tcPr marL="68580" marR="68580" marT="0" marB="0"/>
+                </a:tc>
+                <a:extLst>
+                  <a:ext uri="{0D108BD9-81ED-4DB2-BD59-A6C34878D82A}">
+                    <a16:rowId xmlns:a16="http://schemas.microsoft.com/office/drawing/2014/main" val="42477676"/>
+                  </a:ext>
+                </a:extLst>
+              </a:tr>
+              <a:tr h="1053576">
+                <a:tc>
+                  <a:txBody>
+                    <a:bodyPr/>
+                    <a:lstStyle/>
+                    <a:p>
+                      <a:pPr>
+                        <a:lnSpc>
+                          <a:spcPct val="150000"/>
+                        </a:lnSpc>
+                        <a:spcAft>
+                          <a:spcPts val="600"/>
+                        </a:spcAft>
+                        <a:buNone/>
+                      </a:pPr>
+                      <a:r>
+                        <a:rPr lang="de-DE" sz="1000" kern="100">
+                          <a:effectLst/>
+                          <a:latin typeface="Arial" panose="020B0604020202020204" pitchFamily="34" charset="0"/>
+                          <a:ea typeface="Noto Serif CJK SC"/>
+                          <a:cs typeface="Arial" panose="020B0604020202020204" pitchFamily="34" charset="0"/>
+                        </a:rPr>
+                        <a:t>Geschäftsführung</a:t>
+                      </a:r>
+                      <a:endParaRPr lang="de-DE" sz="1200" kern="100">
+                        <a:effectLst/>
+                        <a:latin typeface="Arial" panose="020B0604020202020204" pitchFamily="34" charset="0"/>
+                        <a:ea typeface="Noto Serif CJK SC"/>
+                        <a:cs typeface="Noto Sans Devanagari" panose="020B0502040504020204" pitchFamily="34" charset="0"/>
+                      </a:endParaRPr>
+                    </a:p>
+                  </a:txBody>
+                  <a:tcPr marL="68580" marR="68580" marT="0" marB="0"/>
+                </a:tc>
+                <a:tc>
+                  <a:txBody>
+                    <a:bodyPr/>
+                    <a:lstStyle/>
+                    <a:p>
+                      <a:pPr>
+                        <a:lnSpc>
+                          <a:spcPct val="150000"/>
+                        </a:lnSpc>
+                        <a:spcAft>
+                          <a:spcPts val="600"/>
+                        </a:spcAft>
+                        <a:buNone/>
+                      </a:pPr>
+                      <a:r>
+                        <a:rPr lang="de-DE" sz="1000" kern="100">
+                          <a:effectLst/>
+                          <a:latin typeface="Arial" panose="020B0604020202020204" pitchFamily="34" charset="0"/>
+                          <a:ea typeface="Noto Serif CJK SC"/>
+                          <a:cs typeface="Arial" panose="020B0604020202020204" pitchFamily="34" charset="0"/>
+                        </a:rPr>
+                        <a:t>Ergebnisse Sprints, Wichtige Entscheidungen, Dokumenationen, Zeitplanänderungen, Product-Backlog Änderungen</a:t>
+                      </a:r>
+                      <a:endParaRPr lang="de-DE" sz="1200" kern="100">
+                        <a:effectLst/>
+                        <a:latin typeface="Arial" panose="020B0604020202020204" pitchFamily="34" charset="0"/>
+                        <a:ea typeface="Noto Serif CJK SC"/>
+                        <a:cs typeface="Noto Sans Devanagari" panose="020B0502040504020204" pitchFamily="34" charset="0"/>
+                      </a:endParaRPr>
+                    </a:p>
+                  </a:txBody>
+                  <a:tcPr marL="68580" marR="68580" marT="0" marB="0"/>
+                </a:tc>
+                <a:tc>
+                  <a:txBody>
+                    <a:bodyPr/>
+                    <a:lstStyle/>
+                    <a:p>
+                      <a:pPr>
+                        <a:lnSpc>
+                          <a:spcPct val="150000"/>
+                        </a:lnSpc>
+                        <a:spcAft>
+                          <a:spcPts val="600"/>
+                        </a:spcAft>
+                        <a:buNone/>
+                      </a:pPr>
+                      <a:r>
+                        <a:rPr lang="de-DE" sz="1000" kern="100" dirty="0">
+                          <a:effectLst/>
+                          <a:latin typeface="Arial" panose="020B0604020202020204" pitchFamily="34" charset="0"/>
+                          <a:ea typeface="Noto Serif CJK SC"/>
+                          <a:cs typeface="Arial" panose="020B0604020202020204" pitchFamily="34" charset="0"/>
+                        </a:rPr>
+                        <a:t>2x wöchentlich</a:t>
+                      </a:r>
+                      <a:endParaRPr lang="de-DE" sz="1200" kern="100" dirty="0">
+                        <a:effectLst/>
+                        <a:latin typeface="Arial" panose="020B0604020202020204" pitchFamily="34" charset="0"/>
+                        <a:ea typeface="Noto Serif CJK SC"/>
+                        <a:cs typeface="Noto Sans Devanagari" panose="020B0502040504020204" pitchFamily="34" charset="0"/>
+                      </a:endParaRPr>
+                    </a:p>
+                  </a:txBody>
+                  <a:tcPr marL="68580" marR="68580" marT="0" marB="0"/>
+                </a:tc>
+                <a:tc>
+                  <a:txBody>
+                    <a:bodyPr/>
+                    <a:lstStyle/>
+                    <a:p>
+                      <a:pPr>
+                        <a:lnSpc>
+                          <a:spcPct val="150000"/>
+                        </a:lnSpc>
+                        <a:spcAft>
+                          <a:spcPts val="600"/>
+                        </a:spcAft>
+                        <a:buNone/>
+                      </a:pPr>
+                      <a:r>
+                        <a:rPr lang="de-DE" sz="1000" kern="100">
+                          <a:effectLst/>
+                          <a:latin typeface="Arial" panose="020B0604020202020204" pitchFamily="34" charset="0"/>
+                          <a:ea typeface="Noto Serif CJK SC"/>
+                          <a:cs typeface="Arial" panose="020B0604020202020204" pitchFamily="34" charset="0"/>
+                        </a:rPr>
+                        <a:t>Per Meeting und Mail</a:t>
+                      </a:r>
+                      <a:endParaRPr lang="de-DE" sz="1200" kern="100">
+                        <a:effectLst/>
+                        <a:latin typeface="Arial" panose="020B0604020202020204" pitchFamily="34" charset="0"/>
+                        <a:ea typeface="Noto Serif CJK SC"/>
+                        <a:cs typeface="Noto Sans Devanagari" panose="020B0502040504020204" pitchFamily="34" charset="0"/>
+                      </a:endParaRPr>
+                    </a:p>
+                  </a:txBody>
+                  <a:tcPr marL="68580" marR="68580" marT="0" marB="0"/>
+                </a:tc>
+                <a:tc>
+                  <a:txBody>
+                    <a:bodyPr/>
+                    <a:lstStyle/>
+                    <a:p>
+                      <a:pPr>
+                        <a:lnSpc>
+                          <a:spcPct val="150000"/>
+                        </a:lnSpc>
+                        <a:spcAft>
+                          <a:spcPts val="600"/>
+                        </a:spcAft>
+                        <a:buNone/>
+                      </a:pPr>
+                      <a:r>
+                        <a:rPr lang="de-DE" sz="1000" kern="100">
+                          <a:effectLst/>
+                          <a:latin typeface="Arial" panose="020B0604020202020204" pitchFamily="34" charset="0"/>
+                          <a:ea typeface="Noto Serif CJK SC"/>
+                          <a:cs typeface="Arial" panose="020B0604020202020204" pitchFamily="34" charset="0"/>
+                        </a:rPr>
+                        <a:t>Scrum Master und Product Owner</a:t>
+                      </a:r>
+                      <a:endParaRPr lang="de-DE" sz="1200" kern="100">
+                        <a:effectLst/>
+                        <a:latin typeface="Arial" panose="020B0604020202020204" pitchFamily="34" charset="0"/>
+                        <a:ea typeface="Noto Serif CJK SC"/>
+                        <a:cs typeface="Noto Sans Devanagari" panose="020B0502040504020204" pitchFamily="34" charset="0"/>
+                      </a:endParaRPr>
+                    </a:p>
+                  </a:txBody>
+                  <a:tcPr marL="68580" marR="68580" marT="0" marB="0"/>
+                </a:tc>
+                <a:extLst>
+                  <a:ext uri="{0D108BD9-81ED-4DB2-BD59-A6C34878D82A}">
+                    <a16:rowId xmlns:a16="http://schemas.microsoft.com/office/drawing/2014/main" val="1203026942"/>
+                  </a:ext>
+                </a:extLst>
+              </a:tr>
+              <a:tr h="509990">
+                <a:tc>
+                  <a:txBody>
+                    <a:bodyPr/>
+                    <a:lstStyle/>
+                    <a:p>
+                      <a:pPr>
+                        <a:lnSpc>
+                          <a:spcPct val="150000"/>
+                        </a:lnSpc>
+                        <a:spcAft>
+                          <a:spcPts val="600"/>
+                        </a:spcAft>
+                        <a:buNone/>
+                      </a:pPr>
+                      <a:r>
+                        <a:rPr lang="de-DE" sz="1000" kern="100">
+                          <a:effectLst/>
+                          <a:latin typeface="Arial" panose="020B0604020202020204" pitchFamily="34" charset="0"/>
+                          <a:ea typeface="Noto Serif CJK SC"/>
+                          <a:cs typeface="Arial" panose="020B0604020202020204" pitchFamily="34" charset="0"/>
+                        </a:rPr>
+                        <a:t>HR-Abteilung</a:t>
+                      </a:r>
+                      <a:endParaRPr lang="de-DE" sz="1200" kern="100">
+                        <a:effectLst/>
+                        <a:latin typeface="Arial" panose="020B0604020202020204" pitchFamily="34" charset="0"/>
+                        <a:ea typeface="Noto Serif CJK SC"/>
+                        <a:cs typeface="Noto Sans Devanagari" panose="020B0502040504020204" pitchFamily="34" charset="0"/>
+                      </a:endParaRPr>
+                    </a:p>
+                  </a:txBody>
+                  <a:tcPr marL="68580" marR="68580" marT="0" marB="0"/>
+                </a:tc>
+                <a:tc>
+                  <a:txBody>
+                    <a:bodyPr/>
+                    <a:lstStyle/>
+                    <a:p>
+                      <a:pPr>
+                        <a:lnSpc>
+                          <a:spcPct val="150000"/>
+                        </a:lnSpc>
+                        <a:spcAft>
+                          <a:spcPts val="600"/>
+                        </a:spcAft>
+                        <a:buNone/>
+                      </a:pPr>
+                      <a:r>
+                        <a:rPr lang="de-DE" sz="1000" kern="100">
+                          <a:effectLst/>
+                          <a:latin typeface="Arial" panose="020B0604020202020204" pitchFamily="34" charset="0"/>
+                          <a:ea typeface="Noto Serif CJK SC"/>
+                          <a:cs typeface="Arial" panose="020B0604020202020204" pitchFamily="34" charset="0"/>
+                        </a:rPr>
+                        <a:t>Stand der Software, potenzielle Änderungen am Product Backlog</a:t>
+                      </a:r>
+                      <a:endParaRPr lang="de-DE" sz="1200" kern="100">
+                        <a:effectLst/>
+                        <a:latin typeface="Arial" panose="020B0604020202020204" pitchFamily="34" charset="0"/>
+                        <a:ea typeface="Noto Serif CJK SC"/>
+                        <a:cs typeface="Noto Sans Devanagari" panose="020B0502040504020204" pitchFamily="34" charset="0"/>
+                      </a:endParaRPr>
+                    </a:p>
+                  </a:txBody>
+                  <a:tcPr marL="68580" marR="68580" marT="0" marB="0"/>
+                </a:tc>
+                <a:tc>
+                  <a:txBody>
+                    <a:bodyPr/>
+                    <a:lstStyle/>
+                    <a:p>
+                      <a:pPr>
+                        <a:lnSpc>
+                          <a:spcPct val="150000"/>
+                        </a:lnSpc>
+                        <a:spcAft>
+                          <a:spcPts val="600"/>
+                        </a:spcAft>
+                        <a:buNone/>
+                      </a:pPr>
+                      <a:r>
+                        <a:rPr lang="de-DE" sz="1000" kern="100">
+                          <a:effectLst/>
+                          <a:latin typeface="Arial" panose="020B0604020202020204" pitchFamily="34" charset="0"/>
+                          <a:ea typeface="Noto Serif CJK SC"/>
+                          <a:cs typeface="Arial" panose="020B0604020202020204" pitchFamily="34" charset="0"/>
+                        </a:rPr>
+                        <a:t>1x alle zwei Wochen</a:t>
+                      </a:r>
+                      <a:endParaRPr lang="de-DE" sz="1200" kern="100">
+                        <a:effectLst/>
+                        <a:latin typeface="Arial" panose="020B0604020202020204" pitchFamily="34" charset="0"/>
+                        <a:ea typeface="Noto Serif CJK SC"/>
+                        <a:cs typeface="Noto Sans Devanagari" panose="020B0502040504020204" pitchFamily="34" charset="0"/>
+                      </a:endParaRPr>
+                    </a:p>
+                  </a:txBody>
+                  <a:tcPr marL="68580" marR="68580" marT="0" marB="0"/>
+                </a:tc>
+                <a:tc>
+                  <a:txBody>
+                    <a:bodyPr/>
+                    <a:lstStyle/>
+                    <a:p>
+                      <a:pPr>
+                        <a:lnSpc>
+                          <a:spcPct val="150000"/>
+                        </a:lnSpc>
+                        <a:spcAft>
+                          <a:spcPts val="600"/>
+                        </a:spcAft>
+                        <a:buNone/>
+                      </a:pPr>
+                      <a:r>
+                        <a:rPr lang="de-DE" sz="1000" kern="100">
+                          <a:effectLst/>
+                          <a:latin typeface="Arial" panose="020B0604020202020204" pitchFamily="34" charset="0"/>
+                          <a:ea typeface="Noto Serif CJK SC"/>
+                          <a:cs typeface="Arial" panose="020B0604020202020204" pitchFamily="34" charset="0"/>
+                        </a:rPr>
+                        <a:t>Per Meeting</a:t>
+                      </a:r>
+                      <a:endParaRPr lang="de-DE" sz="1200" kern="100">
+                        <a:effectLst/>
+                        <a:latin typeface="Arial" panose="020B0604020202020204" pitchFamily="34" charset="0"/>
+                        <a:ea typeface="Noto Serif CJK SC"/>
+                        <a:cs typeface="Noto Sans Devanagari" panose="020B0502040504020204" pitchFamily="34" charset="0"/>
+                      </a:endParaRPr>
+                    </a:p>
+                  </a:txBody>
+                  <a:tcPr marL="68580" marR="68580" marT="0" marB="0"/>
+                </a:tc>
+                <a:tc>
+                  <a:txBody>
+                    <a:bodyPr/>
+                    <a:lstStyle/>
+                    <a:p>
+                      <a:pPr>
+                        <a:lnSpc>
+                          <a:spcPct val="150000"/>
+                        </a:lnSpc>
+                        <a:spcAft>
+                          <a:spcPts val="600"/>
+                        </a:spcAft>
+                        <a:buNone/>
+                      </a:pPr>
+                      <a:r>
+                        <a:rPr lang="de-DE" sz="1000" kern="100">
+                          <a:effectLst/>
+                          <a:latin typeface="Arial" panose="020B0604020202020204" pitchFamily="34" charset="0"/>
+                          <a:ea typeface="Noto Serif CJK SC"/>
+                          <a:cs typeface="Arial" panose="020B0604020202020204" pitchFamily="34" charset="0"/>
+                        </a:rPr>
+                        <a:t>Scrum Master und Product Owner</a:t>
+                      </a:r>
+                      <a:endParaRPr lang="de-DE" sz="1200" kern="100">
+                        <a:effectLst/>
+                        <a:latin typeface="Arial" panose="020B0604020202020204" pitchFamily="34" charset="0"/>
+                        <a:ea typeface="Noto Serif CJK SC"/>
+                        <a:cs typeface="Noto Sans Devanagari" panose="020B0502040504020204" pitchFamily="34" charset="0"/>
+                      </a:endParaRPr>
+                    </a:p>
+                  </a:txBody>
+                  <a:tcPr marL="68580" marR="68580" marT="0" marB="0"/>
+                </a:tc>
+                <a:extLst>
+                  <a:ext uri="{0D108BD9-81ED-4DB2-BD59-A6C34878D82A}">
+                    <a16:rowId xmlns:a16="http://schemas.microsoft.com/office/drawing/2014/main" val="3531154469"/>
+                  </a:ext>
+                </a:extLst>
+              </a:tr>
+              <a:tr h="509990">
+                <a:tc>
+                  <a:txBody>
+                    <a:bodyPr/>
+                    <a:lstStyle/>
+                    <a:p>
+                      <a:pPr>
+                        <a:lnSpc>
+                          <a:spcPct val="150000"/>
+                        </a:lnSpc>
+                        <a:spcAft>
+                          <a:spcPts val="600"/>
+                        </a:spcAft>
+                        <a:buNone/>
+                      </a:pPr>
+                      <a:r>
+                        <a:rPr lang="de-DE" sz="1000" kern="100">
+                          <a:effectLst/>
+                          <a:latin typeface="Arial" panose="020B0604020202020204" pitchFamily="34" charset="0"/>
+                          <a:ea typeface="Noto Serif CJK SC"/>
+                          <a:cs typeface="Arial" panose="020B0604020202020204" pitchFamily="34" charset="0"/>
+                        </a:rPr>
+                        <a:t>IT-Infrastruktur</a:t>
+                      </a:r>
+                      <a:endParaRPr lang="de-DE" sz="1200" kern="100">
+                        <a:effectLst/>
+                        <a:latin typeface="Arial" panose="020B0604020202020204" pitchFamily="34" charset="0"/>
+                        <a:ea typeface="Noto Serif CJK SC"/>
+                        <a:cs typeface="Noto Sans Devanagari" panose="020B0502040504020204" pitchFamily="34" charset="0"/>
+                      </a:endParaRPr>
+                    </a:p>
+                  </a:txBody>
+                  <a:tcPr marL="68580" marR="68580" marT="0" marB="0"/>
+                </a:tc>
+                <a:tc>
+                  <a:txBody>
+                    <a:bodyPr/>
+                    <a:lstStyle/>
+                    <a:p>
+                      <a:pPr>
+                        <a:lnSpc>
+                          <a:spcPct val="150000"/>
+                        </a:lnSpc>
+                        <a:spcAft>
+                          <a:spcPts val="600"/>
+                        </a:spcAft>
+                        <a:buNone/>
+                      </a:pPr>
+                      <a:r>
+                        <a:rPr lang="de-DE" sz="1000" kern="100">
+                          <a:effectLst/>
+                          <a:latin typeface="Arial" panose="020B0604020202020204" pitchFamily="34" charset="0"/>
+                          <a:ea typeface="Noto Serif CJK SC"/>
+                          <a:cs typeface="Arial" panose="020B0604020202020204" pitchFamily="34" charset="0"/>
+                        </a:rPr>
+                        <a:t>Geänderte Software-Anforderungen</a:t>
+                      </a:r>
+                      <a:endParaRPr lang="de-DE" sz="1200" kern="100">
+                        <a:effectLst/>
+                        <a:latin typeface="Arial" panose="020B0604020202020204" pitchFamily="34" charset="0"/>
+                        <a:ea typeface="Noto Serif CJK SC"/>
+                        <a:cs typeface="Noto Sans Devanagari" panose="020B0502040504020204" pitchFamily="34" charset="0"/>
+                      </a:endParaRPr>
+                    </a:p>
+                  </a:txBody>
+                  <a:tcPr marL="68580" marR="68580" marT="0" marB="0"/>
+                </a:tc>
+                <a:tc>
+                  <a:txBody>
+                    <a:bodyPr/>
+                    <a:lstStyle/>
+                    <a:p>
+                      <a:pPr>
+                        <a:lnSpc>
+                          <a:spcPct val="150000"/>
+                        </a:lnSpc>
+                        <a:spcAft>
+                          <a:spcPts val="600"/>
+                        </a:spcAft>
+                        <a:buNone/>
+                      </a:pPr>
+                      <a:r>
+                        <a:rPr lang="de-DE" sz="1000" kern="100">
+                          <a:effectLst/>
+                          <a:latin typeface="Arial" panose="020B0604020202020204" pitchFamily="34" charset="0"/>
+                          <a:ea typeface="Noto Serif CJK SC"/>
+                          <a:cs typeface="Arial" panose="020B0604020202020204" pitchFamily="34" charset="0"/>
+                        </a:rPr>
+                        <a:t>1x monatlich</a:t>
+                      </a:r>
+                      <a:endParaRPr lang="de-DE" sz="1200" kern="100">
+                        <a:effectLst/>
+                        <a:latin typeface="Arial" panose="020B0604020202020204" pitchFamily="34" charset="0"/>
+                        <a:ea typeface="Noto Serif CJK SC"/>
+                        <a:cs typeface="Noto Sans Devanagari" panose="020B0502040504020204" pitchFamily="34" charset="0"/>
+                      </a:endParaRPr>
+                    </a:p>
+                  </a:txBody>
+                  <a:tcPr marL="68580" marR="68580" marT="0" marB="0"/>
+                </a:tc>
+                <a:tc>
+                  <a:txBody>
+                    <a:bodyPr/>
+                    <a:lstStyle/>
+                    <a:p>
+                      <a:pPr>
+                        <a:lnSpc>
+                          <a:spcPct val="150000"/>
+                        </a:lnSpc>
+                        <a:spcAft>
+                          <a:spcPts val="600"/>
+                        </a:spcAft>
+                        <a:buNone/>
+                      </a:pPr>
+                      <a:r>
+                        <a:rPr lang="de-DE" sz="1000" kern="100">
+                          <a:effectLst/>
+                          <a:latin typeface="Arial" panose="020B0604020202020204" pitchFamily="34" charset="0"/>
+                          <a:ea typeface="Noto Serif CJK SC"/>
+                          <a:cs typeface="Arial" panose="020B0604020202020204" pitchFamily="34" charset="0"/>
+                        </a:rPr>
+                        <a:t>Per Mail</a:t>
+                      </a:r>
+                      <a:endParaRPr lang="de-DE" sz="1200" kern="100">
+                        <a:effectLst/>
+                        <a:latin typeface="Arial" panose="020B0604020202020204" pitchFamily="34" charset="0"/>
+                        <a:ea typeface="Noto Serif CJK SC"/>
+                        <a:cs typeface="Noto Sans Devanagari" panose="020B0502040504020204" pitchFamily="34" charset="0"/>
+                      </a:endParaRPr>
+                    </a:p>
+                  </a:txBody>
+                  <a:tcPr marL="68580" marR="68580" marT="0" marB="0"/>
+                </a:tc>
+                <a:tc>
+                  <a:txBody>
+                    <a:bodyPr/>
+                    <a:lstStyle/>
+                    <a:p>
+                      <a:pPr>
+                        <a:lnSpc>
+                          <a:spcPct val="150000"/>
+                        </a:lnSpc>
+                        <a:spcAft>
+                          <a:spcPts val="600"/>
+                        </a:spcAft>
+                        <a:buNone/>
+                      </a:pPr>
+                      <a:r>
+                        <a:rPr lang="de-DE" sz="1000" kern="100">
+                          <a:effectLst/>
+                          <a:latin typeface="Arial" panose="020B0604020202020204" pitchFamily="34" charset="0"/>
+                          <a:ea typeface="Noto Serif CJK SC"/>
+                          <a:cs typeface="Arial" panose="020B0604020202020204" pitchFamily="34" charset="0"/>
+                        </a:rPr>
+                        <a:t>Scrum Master und Entwickler</a:t>
+                      </a:r>
+                      <a:endParaRPr lang="de-DE" sz="1200" kern="100">
+                        <a:effectLst/>
+                        <a:latin typeface="Arial" panose="020B0604020202020204" pitchFamily="34" charset="0"/>
+                        <a:ea typeface="Noto Serif CJK SC"/>
+                        <a:cs typeface="Noto Sans Devanagari" panose="020B0502040504020204" pitchFamily="34" charset="0"/>
+                      </a:endParaRPr>
+                    </a:p>
+                  </a:txBody>
+                  <a:tcPr marL="68580" marR="68580" marT="0" marB="0"/>
+                </a:tc>
+                <a:extLst>
+                  <a:ext uri="{0D108BD9-81ED-4DB2-BD59-A6C34878D82A}">
+                    <a16:rowId xmlns:a16="http://schemas.microsoft.com/office/drawing/2014/main" val="753838855"/>
+                  </a:ext>
+                </a:extLst>
+              </a:tr>
+              <a:tr h="781783">
+                <a:tc>
+                  <a:txBody>
+                    <a:bodyPr/>
+                    <a:lstStyle/>
+                    <a:p>
+                      <a:pPr>
+                        <a:lnSpc>
+                          <a:spcPct val="150000"/>
+                        </a:lnSpc>
+                        <a:spcAft>
+                          <a:spcPts val="600"/>
+                        </a:spcAft>
+                        <a:buNone/>
+                      </a:pPr>
+                      <a:r>
+                        <a:rPr lang="de-DE" sz="1000" kern="100">
+                          <a:effectLst/>
+                          <a:latin typeface="Arial" panose="020B0604020202020204" pitchFamily="34" charset="0"/>
+                          <a:ea typeface="Noto Serif CJK SC"/>
+                          <a:cs typeface="Arial" panose="020B0604020202020204" pitchFamily="34" charset="0"/>
+                        </a:rPr>
+                        <a:t>IT-Entwickler</a:t>
+                      </a:r>
+                      <a:endParaRPr lang="de-DE" sz="1200" kern="100">
+                        <a:effectLst/>
+                        <a:latin typeface="Arial" panose="020B0604020202020204" pitchFamily="34" charset="0"/>
+                        <a:ea typeface="Noto Serif CJK SC"/>
+                        <a:cs typeface="Noto Sans Devanagari" panose="020B0502040504020204" pitchFamily="34" charset="0"/>
+                      </a:endParaRPr>
+                    </a:p>
+                  </a:txBody>
+                  <a:tcPr marL="68580" marR="68580" marT="0" marB="0"/>
+                </a:tc>
+                <a:tc>
+                  <a:txBody>
+                    <a:bodyPr/>
+                    <a:lstStyle/>
+                    <a:p>
+                      <a:pPr>
+                        <a:lnSpc>
+                          <a:spcPct val="150000"/>
+                        </a:lnSpc>
+                        <a:spcAft>
+                          <a:spcPts val="600"/>
+                        </a:spcAft>
+                        <a:buNone/>
+                      </a:pPr>
+                      <a:r>
+                        <a:rPr lang="de-DE" sz="1000" kern="100">
+                          <a:effectLst/>
+                          <a:latin typeface="Arial" panose="020B0604020202020204" pitchFamily="34" charset="0"/>
+                          <a:ea typeface="Noto Serif CJK SC"/>
+                          <a:cs typeface="Arial" panose="020B0604020202020204" pitchFamily="34" charset="0"/>
+                        </a:rPr>
+                        <a:t>Änderungen an der API, wesentliche Änderungen am Source Code</a:t>
+                      </a:r>
+                      <a:endParaRPr lang="de-DE" sz="1200" kern="100">
+                        <a:effectLst/>
+                        <a:latin typeface="Arial" panose="020B0604020202020204" pitchFamily="34" charset="0"/>
+                        <a:ea typeface="Noto Serif CJK SC"/>
+                        <a:cs typeface="Noto Sans Devanagari" panose="020B0502040504020204" pitchFamily="34" charset="0"/>
+                      </a:endParaRPr>
+                    </a:p>
+                  </a:txBody>
+                  <a:tcPr marL="68580" marR="68580" marT="0" marB="0"/>
+                </a:tc>
+                <a:tc>
+                  <a:txBody>
+                    <a:bodyPr/>
+                    <a:lstStyle/>
+                    <a:p>
+                      <a:pPr>
+                        <a:lnSpc>
+                          <a:spcPct val="150000"/>
+                        </a:lnSpc>
+                        <a:spcAft>
+                          <a:spcPts val="600"/>
+                        </a:spcAft>
+                        <a:buNone/>
+                      </a:pPr>
+                      <a:r>
+                        <a:rPr lang="de-DE" sz="1000" kern="100">
+                          <a:effectLst/>
+                          <a:latin typeface="Arial" panose="020B0604020202020204" pitchFamily="34" charset="0"/>
+                          <a:ea typeface="Noto Serif CJK SC"/>
+                          <a:cs typeface="Arial" panose="020B0604020202020204" pitchFamily="34" charset="0"/>
+                        </a:rPr>
+                        <a:t>1x monatlich</a:t>
+                      </a:r>
+                      <a:endParaRPr lang="de-DE" sz="1200" kern="100">
+                        <a:effectLst/>
+                        <a:latin typeface="Arial" panose="020B0604020202020204" pitchFamily="34" charset="0"/>
+                        <a:ea typeface="Noto Serif CJK SC"/>
+                        <a:cs typeface="Noto Sans Devanagari" panose="020B0502040504020204" pitchFamily="34" charset="0"/>
+                      </a:endParaRPr>
+                    </a:p>
+                  </a:txBody>
+                  <a:tcPr marL="68580" marR="68580" marT="0" marB="0"/>
+                </a:tc>
+                <a:tc>
+                  <a:txBody>
+                    <a:bodyPr/>
+                    <a:lstStyle/>
+                    <a:p>
+                      <a:pPr>
+                        <a:lnSpc>
+                          <a:spcPct val="150000"/>
+                        </a:lnSpc>
+                        <a:spcAft>
+                          <a:spcPts val="600"/>
+                        </a:spcAft>
+                        <a:buNone/>
+                      </a:pPr>
+                      <a:r>
+                        <a:rPr lang="de-DE" sz="1000" kern="100">
+                          <a:effectLst/>
+                          <a:latin typeface="Arial" panose="020B0604020202020204" pitchFamily="34" charset="0"/>
+                          <a:ea typeface="Noto Serif CJK SC"/>
+                          <a:cs typeface="Arial" panose="020B0604020202020204" pitchFamily="34" charset="0"/>
+                        </a:rPr>
+                        <a:t>Per Meeting und Mail</a:t>
+                      </a:r>
+                      <a:endParaRPr lang="de-DE" sz="1200" kern="100">
+                        <a:effectLst/>
+                        <a:latin typeface="Arial" panose="020B0604020202020204" pitchFamily="34" charset="0"/>
+                        <a:ea typeface="Noto Serif CJK SC"/>
+                        <a:cs typeface="Noto Sans Devanagari" panose="020B0502040504020204" pitchFamily="34" charset="0"/>
+                      </a:endParaRPr>
+                    </a:p>
+                  </a:txBody>
+                  <a:tcPr marL="68580" marR="68580" marT="0" marB="0"/>
+                </a:tc>
+                <a:tc>
+                  <a:txBody>
+                    <a:bodyPr/>
+                    <a:lstStyle/>
+                    <a:p>
+                      <a:pPr>
+                        <a:lnSpc>
+                          <a:spcPct val="150000"/>
+                        </a:lnSpc>
+                        <a:spcAft>
+                          <a:spcPts val="600"/>
+                        </a:spcAft>
+                        <a:buNone/>
+                      </a:pPr>
+                      <a:r>
+                        <a:rPr lang="de-DE" sz="1000" kern="100">
+                          <a:effectLst/>
+                          <a:latin typeface="Arial" panose="020B0604020202020204" pitchFamily="34" charset="0"/>
+                          <a:ea typeface="Noto Serif CJK SC"/>
+                          <a:cs typeface="Arial" panose="020B0604020202020204" pitchFamily="34" charset="0"/>
+                        </a:rPr>
+                        <a:t>Entwickler</a:t>
+                      </a:r>
+                      <a:endParaRPr lang="de-DE" sz="1200" kern="100">
+                        <a:effectLst/>
+                        <a:latin typeface="Arial" panose="020B0604020202020204" pitchFamily="34" charset="0"/>
+                        <a:ea typeface="Noto Serif CJK SC"/>
+                        <a:cs typeface="Noto Sans Devanagari" panose="020B0502040504020204" pitchFamily="34" charset="0"/>
+                      </a:endParaRPr>
+                    </a:p>
+                  </a:txBody>
+                  <a:tcPr marL="68580" marR="68580" marT="0" marB="0"/>
+                </a:tc>
+                <a:extLst>
+                  <a:ext uri="{0D108BD9-81ED-4DB2-BD59-A6C34878D82A}">
+                    <a16:rowId xmlns:a16="http://schemas.microsoft.com/office/drawing/2014/main" val="1484960447"/>
+                  </a:ext>
+                </a:extLst>
+              </a:tr>
+              <a:tr h="440909">
+                <a:tc>
+                  <a:txBody>
+                    <a:bodyPr/>
+                    <a:lstStyle/>
+                    <a:p>
+                      <a:pPr>
+                        <a:lnSpc>
+                          <a:spcPct val="150000"/>
+                        </a:lnSpc>
+                        <a:spcAft>
+                          <a:spcPts val="600"/>
+                        </a:spcAft>
+                        <a:buNone/>
+                      </a:pPr>
+                      <a:r>
+                        <a:rPr lang="de-DE" sz="1000" kern="100">
+                          <a:effectLst/>
+                          <a:latin typeface="Arial" panose="020B0604020202020204" pitchFamily="34" charset="0"/>
+                          <a:ea typeface="Noto Serif CJK SC"/>
+                          <a:cs typeface="Arial" panose="020B0604020202020204" pitchFamily="34" charset="0"/>
+                        </a:rPr>
+                        <a:t>IT-Security</a:t>
+                      </a:r>
+                      <a:endParaRPr lang="de-DE" sz="1200" kern="100">
+                        <a:effectLst/>
+                        <a:latin typeface="Arial" panose="020B0604020202020204" pitchFamily="34" charset="0"/>
+                        <a:ea typeface="Noto Serif CJK SC"/>
+                        <a:cs typeface="Noto Sans Devanagari" panose="020B0502040504020204" pitchFamily="34" charset="0"/>
+                      </a:endParaRPr>
+                    </a:p>
+                  </a:txBody>
+                  <a:tcPr marL="68580" marR="68580" marT="0" marB="0"/>
+                </a:tc>
+                <a:tc>
+                  <a:txBody>
+                    <a:bodyPr/>
+                    <a:lstStyle/>
+                    <a:p>
+                      <a:pPr>
+                        <a:lnSpc>
+                          <a:spcPct val="150000"/>
+                        </a:lnSpc>
+                        <a:spcAft>
+                          <a:spcPts val="600"/>
+                        </a:spcAft>
+                        <a:buNone/>
+                      </a:pPr>
+                      <a:r>
+                        <a:rPr lang="de-DE" sz="1000" kern="100">
+                          <a:effectLst/>
+                          <a:latin typeface="Arial" panose="020B0604020202020204" pitchFamily="34" charset="0"/>
+                          <a:ea typeface="Noto Serif CJK SC"/>
+                          <a:cs typeface="Arial" panose="020B0604020202020204" pitchFamily="34" charset="0"/>
+                        </a:rPr>
+                        <a:t>Stand der Sicherheit im Projekt</a:t>
+                      </a:r>
+                      <a:endParaRPr lang="de-DE" sz="1200" kern="100">
+                        <a:effectLst/>
+                        <a:latin typeface="Arial" panose="020B0604020202020204" pitchFamily="34" charset="0"/>
+                        <a:ea typeface="Noto Serif CJK SC"/>
+                        <a:cs typeface="Noto Sans Devanagari" panose="020B0502040504020204" pitchFamily="34" charset="0"/>
+                      </a:endParaRPr>
+                    </a:p>
+                  </a:txBody>
+                  <a:tcPr marL="68580" marR="68580" marT="0" marB="0"/>
+                </a:tc>
+                <a:tc>
+                  <a:txBody>
+                    <a:bodyPr/>
+                    <a:lstStyle/>
+                    <a:p>
+                      <a:pPr>
+                        <a:lnSpc>
+                          <a:spcPct val="150000"/>
+                        </a:lnSpc>
+                        <a:spcAft>
+                          <a:spcPts val="600"/>
+                        </a:spcAft>
+                        <a:buNone/>
+                      </a:pPr>
+                      <a:r>
+                        <a:rPr lang="de-DE" sz="1000" kern="100">
+                          <a:effectLst/>
+                          <a:latin typeface="Arial" panose="020B0604020202020204" pitchFamily="34" charset="0"/>
+                          <a:ea typeface="Noto Serif CJK SC"/>
+                          <a:cs typeface="Arial" panose="020B0604020202020204" pitchFamily="34" charset="0"/>
+                        </a:rPr>
+                        <a:t>1x monatlich</a:t>
+                      </a:r>
+                      <a:endParaRPr lang="de-DE" sz="1200" kern="100">
+                        <a:effectLst/>
+                        <a:latin typeface="Arial" panose="020B0604020202020204" pitchFamily="34" charset="0"/>
+                        <a:ea typeface="Noto Serif CJK SC"/>
+                        <a:cs typeface="Noto Sans Devanagari" panose="020B0502040504020204" pitchFamily="34" charset="0"/>
+                      </a:endParaRPr>
+                    </a:p>
+                  </a:txBody>
+                  <a:tcPr marL="68580" marR="68580" marT="0" marB="0"/>
+                </a:tc>
+                <a:tc>
+                  <a:txBody>
+                    <a:bodyPr/>
+                    <a:lstStyle/>
+                    <a:p>
+                      <a:pPr>
+                        <a:lnSpc>
+                          <a:spcPct val="150000"/>
+                        </a:lnSpc>
+                        <a:spcAft>
+                          <a:spcPts val="600"/>
+                        </a:spcAft>
+                        <a:buNone/>
+                      </a:pPr>
+                      <a:r>
+                        <a:rPr lang="de-DE" sz="1000" kern="100">
+                          <a:effectLst/>
+                          <a:latin typeface="Arial" panose="020B0604020202020204" pitchFamily="34" charset="0"/>
+                          <a:ea typeface="Noto Serif CJK SC"/>
+                          <a:cs typeface="Arial" panose="020B0604020202020204" pitchFamily="34" charset="0"/>
+                        </a:rPr>
+                        <a:t>Per Mail</a:t>
+                      </a:r>
+                      <a:endParaRPr lang="de-DE" sz="1200" kern="100">
+                        <a:effectLst/>
+                        <a:latin typeface="Arial" panose="020B0604020202020204" pitchFamily="34" charset="0"/>
+                        <a:ea typeface="Noto Serif CJK SC"/>
+                        <a:cs typeface="Noto Sans Devanagari" panose="020B0502040504020204" pitchFamily="34" charset="0"/>
+                      </a:endParaRPr>
+                    </a:p>
+                  </a:txBody>
+                  <a:tcPr marL="68580" marR="68580" marT="0" marB="0"/>
+                </a:tc>
+                <a:tc>
+                  <a:txBody>
+                    <a:bodyPr/>
+                    <a:lstStyle/>
+                    <a:p>
+                      <a:pPr>
+                        <a:lnSpc>
+                          <a:spcPct val="150000"/>
+                        </a:lnSpc>
+                        <a:spcAft>
+                          <a:spcPts val="600"/>
+                        </a:spcAft>
+                        <a:buNone/>
+                      </a:pPr>
+                      <a:r>
+                        <a:rPr lang="de-DE" sz="1000" kern="100">
+                          <a:effectLst/>
+                          <a:latin typeface="Arial" panose="020B0604020202020204" pitchFamily="34" charset="0"/>
+                          <a:ea typeface="Noto Serif CJK SC"/>
+                          <a:cs typeface="Arial" panose="020B0604020202020204" pitchFamily="34" charset="0"/>
+                        </a:rPr>
+                        <a:t>Scrum-Master</a:t>
+                      </a:r>
+                      <a:endParaRPr lang="de-DE" sz="1200" kern="100">
+                        <a:effectLst/>
+                        <a:latin typeface="Arial" panose="020B0604020202020204" pitchFamily="34" charset="0"/>
+                        <a:ea typeface="Noto Serif CJK SC"/>
+                        <a:cs typeface="Noto Sans Devanagari" panose="020B0502040504020204" pitchFamily="34" charset="0"/>
+                      </a:endParaRPr>
+                    </a:p>
+                  </a:txBody>
+                  <a:tcPr marL="68580" marR="68580" marT="0" marB="0"/>
+                </a:tc>
+                <a:extLst>
+                  <a:ext uri="{0D108BD9-81ED-4DB2-BD59-A6C34878D82A}">
+                    <a16:rowId xmlns:a16="http://schemas.microsoft.com/office/drawing/2014/main" val="2423498187"/>
+                  </a:ext>
+                </a:extLst>
+              </a:tr>
+              <a:tr h="509990">
+                <a:tc>
+                  <a:txBody>
+                    <a:bodyPr/>
+                    <a:lstStyle/>
+                    <a:p>
+                      <a:pPr>
+                        <a:lnSpc>
+                          <a:spcPct val="150000"/>
+                        </a:lnSpc>
+                        <a:spcAft>
+                          <a:spcPts val="600"/>
+                        </a:spcAft>
+                        <a:buNone/>
+                      </a:pPr>
+                      <a:r>
+                        <a:rPr lang="de-DE" sz="1000" kern="100">
+                          <a:effectLst/>
+                          <a:latin typeface="Arial" panose="020B0604020202020204" pitchFamily="34" charset="0"/>
+                          <a:ea typeface="Noto Serif CJK SC"/>
+                          <a:cs typeface="Arial" panose="020B0604020202020204" pitchFamily="34" charset="0"/>
+                        </a:rPr>
+                        <a:t>Mitarbeiter</a:t>
+                      </a:r>
+                      <a:endParaRPr lang="de-DE" sz="1200" kern="100">
+                        <a:effectLst/>
+                        <a:latin typeface="Arial" panose="020B0604020202020204" pitchFamily="34" charset="0"/>
+                        <a:ea typeface="Noto Serif CJK SC"/>
+                        <a:cs typeface="Noto Sans Devanagari" panose="020B0502040504020204" pitchFamily="34" charset="0"/>
+                      </a:endParaRPr>
+                    </a:p>
+                  </a:txBody>
+                  <a:tcPr marL="68580" marR="68580" marT="0" marB="0"/>
+                </a:tc>
+                <a:tc>
+                  <a:txBody>
+                    <a:bodyPr/>
+                    <a:lstStyle/>
+                    <a:p>
+                      <a:pPr>
+                        <a:lnSpc>
+                          <a:spcPct val="150000"/>
+                        </a:lnSpc>
+                        <a:spcAft>
+                          <a:spcPts val="600"/>
+                        </a:spcAft>
+                        <a:buNone/>
+                      </a:pPr>
+                      <a:r>
+                        <a:rPr lang="de-DE" sz="1000" kern="100">
+                          <a:effectLst/>
+                          <a:latin typeface="Arial" panose="020B0604020202020204" pitchFamily="34" charset="0"/>
+                          <a:ea typeface="Noto Serif CJK SC"/>
+                          <a:cs typeface="Arial" panose="020B0604020202020204" pitchFamily="34" charset="0"/>
+                        </a:rPr>
+                        <a:t>Newsletter über den aktuellen Stand der Software</a:t>
+                      </a:r>
+                      <a:endParaRPr lang="de-DE" sz="1200" kern="100">
+                        <a:effectLst/>
+                        <a:latin typeface="Arial" panose="020B0604020202020204" pitchFamily="34" charset="0"/>
+                        <a:ea typeface="Noto Serif CJK SC"/>
+                        <a:cs typeface="Noto Sans Devanagari" panose="020B0502040504020204" pitchFamily="34" charset="0"/>
+                      </a:endParaRPr>
+                    </a:p>
+                  </a:txBody>
+                  <a:tcPr marL="68580" marR="68580" marT="0" marB="0"/>
+                </a:tc>
+                <a:tc>
+                  <a:txBody>
+                    <a:bodyPr/>
+                    <a:lstStyle/>
+                    <a:p>
+                      <a:pPr>
+                        <a:lnSpc>
+                          <a:spcPct val="150000"/>
+                        </a:lnSpc>
+                        <a:spcAft>
+                          <a:spcPts val="600"/>
+                        </a:spcAft>
+                        <a:buNone/>
+                      </a:pPr>
+                      <a:r>
+                        <a:rPr lang="de-DE" sz="1000" kern="100">
+                          <a:effectLst/>
+                          <a:latin typeface="Arial" panose="020B0604020202020204" pitchFamily="34" charset="0"/>
+                          <a:ea typeface="Noto Serif CJK SC"/>
+                          <a:cs typeface="Arial" panose="020B0604020202020204" pitchFamily="34" charset="0"/>
+                        </a:rPr>
+                        <a:t>1x monatlich</a:t>
+                      </a:r>
+                      <a:endParaRPr lang="de-DE" sz="1200" kern="100">
+                        <a:effectLst/>
+                        <a:latin typeface="Arial" panose="020B0604020202020204" pitchFamily="34" charset="0"/>
+                        <a:ea typeface="Noto Serif CJK SC"/>
+                        <a:cs typeface="Noto Sans Devanagari" panose="020B0502040504020204" pitchFamily="34" charset="0"/>
+                      </a:endParaRPr>
+                    </a:p>
+                  </a:txBody>
+                  <a:tcPr marL="68580" marR="68580" marT="0" marB="0"/>
+                </a:tc>
+                <a:tc>
+                  <a:txBody>
+                    <a:bodyPr/>
+                    <a:lstStyle/>
+                    <a:p>
+                      <a:pPr>
+                        <a:lnSpc>
+                          <a:spcPct val="150000"/>
+                        </a:lnSpc>
+                        <a:spcAft>
+                          <a:spcPts val="600"/>
+                        </a:spcAft>
+                        <a:buNone/>
+                      </a:pPr>
+                      <a:r>
+                        <a:rPr lang="de-DE" sz="1000" kern="100">
+                          <a:effectLst/>
+                          <a:latin typeface="Arial" panose="020B0604020202020204" pitchFamily="34" charset="0"/>
+                          <a:ea typeface="Noto Serif CJK SC"/>
+                          <a:cs typeface="Arial" panose="020B0604020202020204" pitchFamily="34" charset="0"/>
+                        </a:rPr>
+                        <a:t>Per Mail</a:t>
+                      </a:r>
+                      <a:endParaRPr lang="de-DE" sz="1200" kern="100">
+                        <a:effectLst/>
+                        <a:latin typeface="Arial" panose="020B0604020202020204" pitchFamily="34" charset="0"/>
+                        <a:ea typeface="Noto Serif CJK SC"/>
+                        <a:cs typeface="Noto Sans Devanagari" panose="020B0502040504020204" pitchFamily="34" charset="0"/>
+                      </a:endParaRPr>
+                    </a:p>
+                  </a:txBody>
+                  <a:tcPr marL="68580" marR="68580" marT="0" marB="0"/>
+                </a:tc>
+                <a:tc>
+                  <a:txBody>
+                    <a:bodyPr/>
+                    <a:lstStyle/>
+                    <a:p>
+                      <a:pPr>
+                        <a:lnSpc>
+                          <a:spcPct val="150000"/>
+                        </a:lnSpc>
+                        <a:spcAft>
+                          <a:spcPts val="600"/>
+                        </a:spcAft>
+                        <a:buNone/>
+                      </a:pPr>
+                      <a:r>
+                        <a:rPr lang="de-DE" sz="1000" kern="100" dirty="0">
+                          <a:effectLst/>
+                          <a:latin typeface="Arial" panose="020B0604020202020204" pitchFamily="34" charset="0"/>
+                          <a:ea typeface="Noto Serif CJK SC"/>
+                          <a:cs typeface="Arial" panose="020B0604020202020204" pitchFamily="34" charset="0"/>
+                        </a:rPr>
+                        <a:t>Product-</a:t>
+                      </a:r>
+                      <a:r>
+                        <a:rPr lang="de-DE" sz="1000" kern="100" dirty="0" err="1">
+                          <a:effectLst/>
+                          <a:latin typeface="Arial" panose="020B0604020202020204" pitchFamily="34" charset="0"/>
+                          <a:ea typeface="Noto Serif CJK SC"/>
+                          <a:cs typeface="Arial" panose="020B0604020202020204" pitchFamily="34" charset="0"/>
+                        </a:rPr>
+                        <a:t>Owner</a:t>
+                      </a:r>
+                      <a:endParaRPr lang="de-DE" sz="1200" kern="100" dirty="0">
+                        <a:effectLst/>
+                        <a:latin typeface="Arial" panose="020B0604020202020204" pitchFamily="34" charset="0"/>
+                        <a:ea typeface="Noto Serif CJK SC"/>
+                        <a:cs typeface="Noto Sans Devanagari" panose="020B0502040504020204" pitchFamily="34" charset="0"/>
+                      </a:endParaRPr>
+                    </a:p>
+                  </a:txBody>
+                  <a:tcPr marL="68580" marR="68580" marT="0" marB="0"/>
+                </a:tc>
+                <a:extLst>
+                  <a:ext uri="{0D108BD9-81ED-4DB2-BD59-A6C34878D82A}">
+                    <a16:rowId xmlns:a16="http://schemas.microsoft.com/office/drawing/2014/main" val="3465001880"/>
+                  </a:ext>
+                </a:extLst>
+              </a:tr>
+            </a:tbl>
+          </a:graphicData>
+        </a:graphic>
+      </p:graphicFrame>
     </p:spTree>
     <p:extLst>
       <p:ext uri="{BB962C8B-B14F-4D97-AF65-F5344CB8AC3E}">
@@ -14954,6 +16239,1350 @@
 </file>
 
 <file path=ppt/slides/slide17.xml><?xml version="1.0" encoding="utf-8"?>
+<p:sld xmlns:a="http://schemas.openxmlformats.org/drawingml/2006/main" xmlns:r="http://schemas.openxmlformats.org/officeDocument/2006/relationships" xmlns:p="http://schemas.openxmlformats.org/presentationml/2006/main">
+  <p:cSld>
+    <p:spTree>
+      <p:nvGrpSpPr>
+        <p:cNvPr id="1" name=""/>
+        <p:cNvGrpSpPr/>
+        <p:nvPr/>
+      </p:nvGrpSpPr>
+      <p:grpSpPr>
+        <a:xfrm>
+          <a:off x="0" y="0"/>
+          <a:ext cx="0" cy="0"/>
+          <a:chOff x="0" y="0"/>
+          <a:chExt cx="0" cy="0"/>
+        </a:xfrm>
+      </p:grpSpPr>
+      <p:sp>
+        <p:nvSpPr>
+          <p:cNvPr id="2" name="Titel 1">
+            <a:extLst>
+              <a:ext uri="{FF2B5EF4-FFF2-40B4-BE49-F238E27FC236}">
+                <a16:creationId xmlns:a16="http://schemas.microsoft.com/office/drawing/2014/main" id="{FD596FAE-D141-C376-8325-F6B0C6A09327}"/>
+              </a:ext>
+            </a:extLst>
+          </p:cNvPr>
+          <p:cNvSpPr>
+            <a:spLocks noGrp="1"/>
+          </p:cNvSpPr>
+          <p:nvPr>
+            <p:ph type="title"/>
+          </p:nvPr>
+        </p:nvSpPr>
+        <p:spPr/>
+        <p:txBody>
+          <a:bodyPr/>
+          <a:lstStyle/>
+          <a:p>
+            <a:r>
+              <a:rPr lang="de-DE" dirty="0"/>
+              <a:t>7. Schulungs-/Kommunikationskonzept</a:t>
+            </a:r>
+          </a:p>
+        </p:txBody>
+      </p:sp>
+      <p:graphicFrame>
+        <p:nvGraphicFramePr>
+          <p:cNvPr id="4" name="Tabelle 3">
+            <a:extLst>
+              <a:ext uri="{FF2B5EF4-FFF2-40B4-BE49-F238E27FC236}">
+                <a16:creationId xmlns:a16="http://schemas.microsoft.com/office/drawing/2014/main" id="{3338957F-6A22-4B9E-239A-FD34E3C88EC3}"/>
+              </a:ext>
+            </a:extLst>
+          </p:cNvPr>
+          <p:cNvGraphicFramePr>
+            <a:graphicFrameLocks noGrp="1"/>
+          </p:cNvGraphicFramePr>
+          <p:nvPr>
+            <p:extLst>
+              <p:ext uri="{D42A27DB-BD31-4B8C-83A1-F6EECF244321}">
+                <p14:modId xmlns:p14="http://schemas.microsoft.com/office/powerpoint/2010/main" val="3333871572"/>
+              </p:ext>
+            </p:extLst>
+          </p:nvPr>
+        </p:nvGraphicFramePr>
+        <p:xfrm>
+          <a:off x="5073012" y="1759557"/>
+          <a:ext cx="5973260" cy="4184043"/>
+        </p:xfrm>
+        <a:graphic>
+          <a:graphicData uri="http://schemas.openxmlformats.org/drawingml/2006/table">
+            <a:tbl>
+              <a:tblPr firstRow="1" bandRow="1">
+                <a:tableStyleId>{5C22544A-7EE6-4342-B048-85BDC9FD1C3A}</a:tableStyleId>
+              </a:tblPr>
+              <a:tblGrid>
+                <a:gridCol w="1194652">
+                  <a:extLst>
+                    <a:ext uri="{9D8B030D-6E8A-4147-A177-3AD203B41FA5}">
+                      <a16:colId xmlns:a16="http://schemas.microsoft.com/office/drawing/2014/main" val="4150272577"/>
+                    </a:ext>
+                  </a:extLst>
+                </a:gridCol>
+                <a:gridCol w="1194652">
+                  <a:extLst>
+                    <a:ext uri="{9D8B030D-6E8A-4147-A177-3AD203B41FA5}">
+                      <a16:colId xmlns:a16="http://schemas.microsoft.com/office/drawing/2014/main" val="2813175776"/>
+                    </a:ext>
+                  </a:extLst>
+                </a:gridCol>
+                <a:gridCol w="1194652">
+                  <a:extLst>
+                    <a:ext uri="{9D8B030D-6E8A-4147-A177-3AD203B41FA5}">
+                      <a16:colId xmlns:a16="http://schemas.microsoft.com/office/drawing/2014/main" val="1246378773"/>
+                    </a:ext>
+                  </a:extLst>
+                </a:gridCol>
+                <a:gridCol w="1194652">
+                  <a:extLst>
+                    <a:ext uri="{9D8B030D-6E8A-4147-A177-3AD203B41FA5}">
+                      <a16:colId xmlns:a16="http://schemas.microsoft.com/office/drawing/2014/main" val="4002699303"/>
+                    </a:ext>
+                  </a:extLst>
+                </a:gridCol>
+                <a:gridCol w="1194652">
+                  <a:extLst>
+                    <a:ext uri="{9D8B030D-6E8A-4147-A177-3AD203B41FA5}">
+                      <a16:colId xmlns:a16="http://schemas.microsoft.com/office/drawing/2014/main" val="2296457708"/>
+                    </a:ext>
+                  </a:extLst>
+                </a:gridCol>
+              </a:tblGrid>
+              <a:tr h="511402">
+                <a:tc>
+                  <a:txBody>
+                    <a:bodyPr/>
+                    <a:lstStyle/>
+                    <a:p>
+                      <a:pPr>
+                        <a:lnSpc>
+                          <a:spcPct val="115000"/>
+                        </a:lnSpc>
+                        <a:spcAft>
+                          <a:spcPts val="700"/>
+                        </a:spcAft>
+                        <a:buNone/>
+                      </a:pPr>
+                      <a:r>
+                        <a:rPr lang="de-DE" sz="1000" b="1" kern="100" dirty="0">
+                          <a:effectLst/>
+                          <a:latin typeface="Arial" panose="020B0604020202020204" pitchFamily="34" charset="0"/>
+                          <a:ea typeface="Noto Serif CJK SC"/>
+                          <a:cs typeface="Arial" panose="020B0604020202020204" pitchFamily="34" charset="0"/>
+                        </a:rPr>
+                        <a:t>Stakeholder</a:t>
+                      </a:r>
+                      <a:endParaRPr lang="de-DE" sz="1200" kern="100" dirty="0">
+                        <a:effectLst/>
+                        <a:latin typeface="Arial" panose="020B0604020202020204" pitchFamily="34" charset="0"/>
+                        <a:ea typeface="Noto Serif CJK SC"/>
+                        <a:cs typeface="Noto Sans Devanagari" panose="020B0502040504020204" pitchFamily="34" charset="0"/>
+                      </a:endParaRPr>
+                    </a:p>
+                  </a:txBody>
+                  <a:tcPr marL="68580" marR="68580" marT="0" marB="0"/>
+                </a:tc>
+                <a:tc>
+                  <a:txBody>
+                    <a:bodyPr/>
+                    <a:lstStyle/>
+                    <a:p>
+                      <a:pPr>
+                        <a:lnSpc>
+                          <a:spcPct val="115000"/>
+                        </a:lnSpc>
+                        <a:spcAft>
+                          <a:spcPts val="700"/>
+                        </a:spcAft>
+                        <a:buNone/>
+                      </a:pPr>
+                      <a:r>
+                        <a:rPr lang="de-DE" sz="1000" b="1" kern="100">
+                          <a:effectLst/>
+                          <a:latin typeface="Arial" panose="020B0604020202020204" pitchFamily="34" charset="0"/>
+                          <a:ea typeface="Noto Serif CJK SC"/>
+                          <a:cs typeface="Arial" panose="020B0604020202020204" pitchFamily="34" charset="0"/>
+                        </a:rPr>
+                        <a:t>Art der Schulung</a:t>
+                      </a:r>
+                      <a:endParaRPr lang="de-DE" sz="1200" kern="100">
+                        <a:effectLst/>
+                        <a:latin typeface="Arial" panose="020B0604020202020204" pitchFamily="34" charset="0"/>
+                        <a:ea typeface="Noto Serif CJK SC"/>
+                        <a:cs typeface="Noto Sans Devanagari" panose="020B0502040504020204" pitchFamily="34" charset="0"/>
+                      </a:endParaRPr>
+                    </a:p>
+                  </a:txBody>
+                  <a:tcPr marL="68580" marR="68580" marT="0" marB="0"/>
+                </a:tc>
+                <a:tc>
+                  <a:txBody>
+                    <a:bodyPr/>
+                    <a:lstStyle/>
+                    <a:p>
+                      <a:pPr>
+                        <a:lnSpc>
+                          <a:spcPct val="115000"/>
+                        </a:lnSpc>
+                        <a:spcAft>
+                          <a:spcPts val="700"/>
+                        </a:spcAft>
+                        <a:buNone/>
+                      </a:pPr>
+                      <a:r>
+                        <a:rPr lang="de-DE" sz="1000" b="1" kern="100">
+                          <a:effectLst/>
+                          <a:latin typeface="Arial" panose="020B0604020202020204" pitchFamily="34" charset="0"/>
+                          <a:ea typeface="Noto Serif CJK SC"/>
+                          <a:cs typeface="Arial" panose="020B0604020202020204" pitchFamily="34" charset="0"/>
+                        </a:rPr>
+                        <a:t>Inhalt der Schulung</a:t>
+                      </a:r>
+                      <a:endParaRPr lang="de-DE" sz="1200" kern="100">
+                        <a:effectLst/>
+                        <a:latin typeface="Arial" panose="020B0604020202020204" pitchFamily="34" charset="0"/>
+                        <a:ea typeface="Noto Serif CJK SC"/>
+                        <a:cs typeface="Noto Sans Devanagari" panose="020B0502040504020204" pitchFamily="34" charset="0"/>
+                      </a:endParaRPr>
+                    </a:p>
+                  </a:txBody>
+                  <a:tcPr marL="68580" marR="68580" marT="0" marB="0"/>
+                </a:tc>
+                <a:tc>
+                  <a:txBody>
+                    <a:bodyPr/>
+                    <a:lstStyle/>
+                    <a:p>
+                      <a:pPr>
+                        <a:lnSpc>
+                          <a:spcPct val="115000"/>
+                        </a:lnSpc>
+                        <a:spcAft>
+                          <a:spcPts val="700"/>
+                        </a:spcAft>
+                        <a:buNone/>
+                      </a:pPr>
+                      <a:r>
+                        <a:rPr lang="de-DE" sz="1000" b="1" kern="100">
+                          <a:effectLst/>
+                          <a:latin typeface="Arial" panose="020B0604020202020204" pitchFamily="34" charset="0"/>
+                          <a:ea typeface="Noto Serif CJK SC"/>
+                          <a:cs typeface="Arial" panose="020B0604020202020204" pitchFamily="34" charset="0"/>
+                        </a:rPr>
+                        <a:t>Häufigkeit</a:t>
+                      </a:r>
+                      <a:endParaRPr lang="de-DE" sz="1200" kern="100">
+                        <a:effectLst/>
+                        <a:latin typeface="Arial" panose="020B0604020202020204" pitchFamily="34" charset="0"/>
+                        <a:ea typeface="Noto Serif CJK SC"/>
+                        <a:cs typeface="Noto Sans Devanagari" panose="020B0502040504020204" pitchFamily="34" charset="0"/>
+                      </a:endParaRPr>
+                    </a:p>
+                  </a:txBody>
+                  <a:tcPr marL="68580" marR="68580" marT="0" marB="0"/>
+                </a:tc>
+                <a:tc>
+                  <a:txBody>
+                    <a:bodyPr/>
+                    <a:lstStyle/>
+                    <a:p>
+                      <a:pPr>
+                        <a:lnSpc>
+                          <a:spcPct val="115000"/>
+                        </a:lnSpc>
+                        <a:spcAft>
+                          <a:spcPts val="700"/>
+                        </a:spcAft>
+                        <a:buNone/>
+                      </a:pPr>
+                      <a:r>
+                        <a:rPr lang="de-DE" sz="1000" b="1" kern="100">
+                          <a:effectLst/>
+                          <a:latin typeface="Arial" panose="020B0604020202020204" pitchFamily="34" charset="0"/>
+                          <a:ea typeface="Noto Serif CJK SC"/>
+                          <a:cs typeface="Arial" panose="020B0604020202020204" pitchFamily="34" charset="0"/>
+                        </a:rPr>
+                        <a:t>Verantwortlich</a:t>
+                      </a:r>
+                      <a:endParaRPr lang="de-DE" sz="1200" kern="100">
+                        <a:effectLst/>
+                        <a:latin typeface="Arial" panose="020B0604020202020204" pitchFamily="34" charset="0"/>
+                        <a:ea typeface="Noto Serif CJK SC"/>
+                        <a:cs typeface="Noto Sans Devanagari" panose="020B0502040504020204" pitchFamily="34" charset="0"/>
+                      </a:endParaRPr>
+                    </a:p>
+                  </a:txBody>
+                  <a:tcPr marL="68580" marR="68580" marT="0" marB="0"/>
+                </a:tc>
+                <a:extLst>
+                  <a:ext uri="{0D108BD9-81ED-4DB2-BD59-A6C34878D82A}">
+                    <a16:rowId xmlns:a16="http://schemas.microsoft.com/office/drawing/2014/main" val="2592816854"/>
+                  </a:ext>
+                </a:extLst>
+              </a:tr>
+              <a:tr h="1191375">
+                <a:tc>
+                  <a:txBody>
+                    <a:bodyPr/>
+                    <a:lstStyle/>
+                    <a:p>
+                      <a:pPr>
+                        <a:lnSpc>
+                          <a:spcPct val="115000"/>
+                        </a:lnSpc>
+                        <a:spcAft>
+                          <a:spcPts val="700"/>
+                        </a:spcAft>
+                        <a:buNone/>
+                      </a:pPr>
+                      <a:r>
+                        <a:rPr lang="de-DE" sz="1000" kern="100">
+                          <a:effectLst/>
+                          <a:latin typeface="Arial" panose="020B0604020202020204" pitchFamily="34" charset="0"/>
+                          <a:ea typeface="Noto Serif CJK SC"/>
+                          <a:cs typeface="Arial" panose="020B0604020202020204" pitchFamily="34" charset="0"/>
+                        </a:rPr>
+                        <a:t>IT-Software Entwickler</a:t>
+                      </a:r>
+                      <a:endParaRPr lang="de-DE" sz="1200" kern="100">
+                        <a:effectLst/>
+                        <a:latin typeface="Arial" panose="020B0604020202020204" pitchFamily="34" charset="0"/>
+                        <a:ea typeface="Noto Serif CJK SC"/>
+                        <a:cs typeface="Noto Sans Devanagari" panose="020B0502040504020204" pitchFamily="34" charset="0"/>
+                      </a:endParaRPr>
+                    </a:p>
+                  </a:txBody>
+                  <a:tcPr marL="68580" marR="68580" marT="0" marB="0"/>
+                </a:tc>
+                <a:tc>
+                  <a:txBody>
+                    <a:bodyPr/>
+                    <a:lstStyle/>
+                    <a:p>
+                      <a:pPr>
+                        <a:lnSpc>
+                          <a:spcPct val="115000"/>
+                        </a:lnSpc>
+                        <a:spcAft>
+                          <a:spcPts val="700"/>
+                        </a:spcAft>
+                        <a:buNone/>
+                      </a:pPr>
+                      <a:r>
+                        <a:rPr lang="de-DE" sz="1000" kern="100" dirty="0">
+                          <a:effectLst/>
+                          <a:latin typeface="Arial" panose="020B0604020202020204" pitchFamily="34" charset="0"/>
+                          <a:ea typeface="Noto Serif CJK SC"/>
+                          <a:cs typeface="Arial" panose="020B0604020202020204" pitchFamily="34" charset="0"/>
+                        </a:rPr>
+                        <a:t>Präsentation, Demo</a:t>
+                      </a:r>
+                      <a:endParaRPr lang="de-DE" sz="1200" kern="100" dirty="0">
+                        <a:effectLst/>
+                        <a:latin typeface="Arial" panose="020B0604020202020204" pitchFamily="34" charset="0"/>
+                        <a:ea typeface="Noto Serif CJK SC"/>
+                        <a:cs typeface="Noto Sans Devanagari" panose="020B0502040504020204" pitchFamily="34" charset="0"/>
+                      </a:endParaRPr>
+                    </a:p>
+                  </a:txBody>
+                  <a:tcPr marL="68580" marR="68580" marT="0" marB="0"/>
+                </a:tc>
+                <a:tc>
+                  <a:txBody>
+                    <a:bodyPr/>
+                    <a:lstStyle/>
+                    <a:p>
+                      <a:pPr>
+                        <a:lnSpc>
+                          <a:spcPct val="115000"/>
+                        </a:lnSpc>
+                        <a:spcAft>
+                          <a:spcPts val="700"/>
+                        </a:spcAft>
+                        <a:buNone/>
+                      </a:pPr>
+                      <a:r>
+                        <a:rPr lang="de-DE" sz="1000" kern="100" dirty="0">
+                          <a:effectLst/>
+                          <a:latin typeface="Arial" panose="020B0604020202020204" pitchFamily="34" charset="0"/>
+                          <a:ea typeface="Noto Serif CJK SC"/>
+                          <a:cs typeface="Arial" panose="020B0604020202020204" pitchFamily="34" charset="0"/>
+                        </a:rPr>
+                        <a:t>API und Source Code</a:t>
+                      </a:r>
+                      <a:endParaRPr lang="de-DE" sz="1200" kern="100" dirty="0">
+                        <a:effectLst/>
+                        <a:latin typeface="Arial" panose="020B0604020202020204" pitchFamily="34" charset="0"/>
+                        <a:ea typeface="Noto Serif CJK SC"/>
+                        <a:cs typeface="Noto Sans Devanagari" panose="020B0502040504020204" pitchFamily="34" charset="0"/>
+                      </a:endParaRPr>
+                    </a:p>
+                  </a:txBody>
+                  <a:tcPr marL="68580" marR="68580" marT="0" marB="0"/>
+                </a:tc>
+                <a:tc>
+                  <a:txBody>
+                    <a:bodyPr/>
+                    <a:lstStyle/>
+                    <a:p>
+                      <a:pPr>
+                        <a:lnSpc>
+                          <a:spcPct val="115000"/>
+                        </a:lnSpc>
+                        <a:spcAft>
+                          <a:spcPts val="700"/>
+                        </a:spcAft>
+                        <a:buNone/>
+                      </a:pPr>
+                      <a:r>
+                        <a:rPr lang="de-DE" sz="1000" kern="100">
+                          <a:effectLst/>
+                          <a:latin typeface="Arial" panose="020B0604020202020204" pitchFamily="34" charset="0"/>
+                          <a:ea typeface="Noto Serif CJK SC"/>
+                          <a:cs typeface="Arial" panose="020B0604020202020204" pitchFamily="34" charset="0"/>
+                        </a:rPr>
+                        <a:t>1x bei Release,</a:t>
+                      </a:r>
+                      <a:endParaRPr lang="de-DE" sz="1200" kern="100">
+                        <a:effectLst/>
+                        <a:latin typeface="Arial" panose="020B0604020202020204" pitchFamily="34" charset="0"/>
+                        <a:ea typeface="Noto Serif CJK SC"/>
+                        <a:cs typeface="Noto Sans Devanagari" panose="020B0502040504020204" pitchFamily="34" charset="0"/>
+                      </a:endParaRPr>
+                    </a:p>
+                    <a:p>
+                      <a:pPr>
+                        <a:lnSpc>
+                          <a:spcPct val="115000"/>
+                        </a:lnSpc>
+                        <a:spcAft>
+                          <a:spcPts val="700"/>
+                        </a:spcAft>
+                        <a:buNone/>
+                      </a:pPr>
+                      <a:r>
+                        <a:rPr lang="de-DE" sz="1000" kern="100">
+                          <a:effectLst/>
+                          <a:latin typeface="Arial" panose="020B0604020202020204" pitchFamily="34" charset="0"/>
+                          <a:ea typeface="Noto Serif CJK SC"/>
+                          <a:cs typeface="Arial" panose="020B0604020202020204" pitchFamily="34" charset="0"/>
+                        </a:rPr>
+                        <a:t>1x jährlich für neue Software-Entwickler</a:t>
+                      </a:r>
+                      <a:endParaRPr lang="de-DE" sz="1200" kern="100">
+                        <a:effectLst/>
+                        <a:latin typeface="Arial" panose="020B0604020202020204" pitchFamily="34" charset="0"/>
+                        <a:ea typeface="Noto Serif CJK SC"/>
+                        <a:cs typeface="Noto Sans Devanagari" panose="020B0502040504020204" pitchFamily="34" charset="0"/>
+                      </a:endParaRPr>
+                    </a:p>
+                  </a:txBody>
+                  <a:tcPr marL="68580" marR="68580" marT="0" marB="0"/>
+                </a:tc>
+                <a:tc>
+                  <a:txBody>
+                    <a:bodyPr/>
+                    <a:lstStyle/>
+                    <a:p>
+                      <a:pPr>
+                        <a:lnSpc>
+                          <a:spcPct val="115000"/>
+                        </a:lnSpc>
+                        <a:spcAft>
+                          <a:spcPts val="700"/>
+                        </a:spcAft>
+                        <a:buNone/>
+                      </a:pPr>
+                      <a:r>
+                        <a:rPr lang="de-DE" sz="1000" kern="100">
+                          <a:effectLst/>
+                          <a:latin typeface="Arial" panose="020B0604020202020204" pitchFamily="34" charset="0"/>
+                          <a:ea typeface="Noto Serif CJK SC"/>
+                          <a:cs typeface="Arial" panose="020B0604020202020204" pitchFamily="34" charset="0"/>
+                        </a:rPr>
+                        <a:t>Bei Release: Entwickler</a:t>
+                      </a:r>
+                      <a:endParaRPr lang="de-DE" sz="1200" kern="100">
+                        <a:effectLst/>
+                        <a:latin typeface="Arial" panose="020B0604020202020204" pitchFamily="34" charset="0"/>
+                        <a:ea typeface="Noto Serif CJK SC"/>
+                        <a:cs typeface="Noto Sans Devanagari" panose="020B0502040504020204" pitchFamily="34" charset="0"/>
+                      </a:endParaRPr>
+                    </a:p>
+                    <a:p>
+                      <a:pPr>
+                        <a:lnSpc>
+                          <a:spcPct val="115000"/>
+                        </a:lnSpc>
+                        <a:spcAft>
+                          <a:spcPts val="700"/>
+                        </a:spcAft>
+                        <a:buNone/>
+                      </a:pPr>
+                      <a:r>
+                        <a:rPr lang="de-DE" sz="1000" kern="100">
+                          <a:effectLst/>
+                          <a:latin typeface="Arial" panose="020B0604020202020204" pitchFamily="34" charset="0"/>
+                          <a:ea typeface="Noto Serif CJK SC"/>
+                          <a:cs typeface="Arial" panose="020B0604020202020204" pitchFamily="34" charset="0"/>
+                        </a:rPr>
+                        <a:t>Nach Release: </a:t>
+                      </a:r>
+                      <a:endParaRPr lang="de-DE" sz="1200" kern="100">
+                        <a:effectLst/>
+                        <a:latin typeface="Arial" panose="020B0604020202020204" pitchFamily="34" charset="0"/>
+                        <a:ea typeface="Noto Serif CJK SC"/>
+                        <a:cs typeface="Noto Sans Devanagari" panose="020B0502040504020204" pitchFamily="34" charset="0"/>
+                      </a:endParaRPr>
+                    </a:p>
+                    <a:p>
+                      <a:pPr>
+                        <a:lnSpc>
+                          <a:spcPct val="115000"/>
+                        </a:lnSpc>
+                        <a:spcAft>
+                          <a:spcPts val="700"/>
+                        </a:spcAft>
+                        <a:buNone/>
+                      </a:pPr>
+                      <a:r>
+                        <a:rPr lang="de-DE" sz="1000" kern="100">
+                          <a:effectLst/>
+                          <a:latin typeface="Arial" panose="020B0604020202020204" pitchFamily="34" charset="0"/>
+                          <a:ea typeface="Noto Serif CJK SC"/>
+                          <a:cs typeface="Arial" panose="020B0604020202020204" pitchFamily="34" charset="0"/>
+                        </a:rPr>
+                        <a:t>Product Owner</a:t>
+                      </a:r>
+                      <a:endParaRPr lang="de-DE" sz="1200" kern="100">
+                        <a:effectLst/>
+                        <a:latin typeface="Arial" panose="020B0604020202020204" pitchFamily="34" charset="0"/>
+                        <a:ea typeface="Noto Serif CJK SC"/>
+                        <a:cs typeface="Noto Sans Devanagari" panose="020B0502040504020204" pitchFamily="34" charset="0"/>
+                      </a:endParaRPr>
+                    </a:p>
+                  </a:txBody>
+                  <a:tcPr marL="68580" marR="68580" marT="0" marB="0"/>
+                </a:tc>
+                <a:extLst>
+                  <a:ext uri="{0D108BD9-81ED-4DB2-BD59-A6C34878D82A}">
+                    <a16:rowId xmlns:a16="http://schemas.microsoft.com/office/drawing/2014/main" val="2499973432"/>
+                  </a:ext>
+                </a:extLst>
+              </a:tr>
+              <a:tr h="1191375">
+                <a:tc>
+                  <a:txBody>
+                    <a:bodyPr/>
+                    <a:lstStyle/>
+                    <a:p>
+                      <a:pPr>
+                        <a:lnSpc>
+                          <a:spcPct val="115000"/>
+                        </a:lnSpc>
+                        <a:spcAft>
+                          <a:spcPts val="700"/>
+                        </a:spcAft>
+                        <a:buNone/>
+                      </a:pPr>
+                      <a:r>
+                        <a:rPr lang="de-DE" sz="1000" kern="100">
+                          <a:effectLst/>
+                          <a:latin typeface="Arial" panose="020B0604020202020204" pitchFamily="34" charset="0"/>
+                          <a:ea typeface="Noto Serif CJK SC"/>
+                          <a:cs typeface="Arial" panose="020B0604020202020204" pitchFamily="34" charset="0"/>
+                        </a:rPr>
+                        <a:t>IT-Infrastruktur</a:t>
+                      </a:r>
+                      <a:endParaRPr lang="de-DE" sz="1200" kern="100">
+                        <a:effectLst/>
+                        <a:latin typeface="Arial" panose="020B0604020202020204" pitchFamily="34" charset="0"/>
+                        <a:ea typeface="Noto Serif CJK SC"/>
+                        <a:cs typeface="Noto Sans Devanagari" panose="020B0502040504020204" pitchFamily="34" charset="0"/>
+                      </a:endParaRPr>
+                    </a:p>
+                  </a:txBody>
+                  <a:tcPr marL="68580" marR="68580" marT="0" marB="0"/>
+                </a:tc>
+                <a:tc>
+                  <a:txBody>
+                    <a:bodyPr/>
+                    <a:lstStyle/>
+                    <a:p>
+                      <a:pPr>
+                        <a:lnSpc>
+                          <a:spcPct val="115000"/>
+                        </a:lnSpc>
+                        <a:spcAft>
+                          <a:spcPts val="700"/>
+                        </a:spcAft>
+                        <a:buNone/>
+                      </a:pPr>
+                      <a:r>
+                        <a:rPr lang="de-DE" sz="1000" kern="100">
+                          <a:effectLst/>
+                          <a:latin typeface="Arial" panose="020B0604020202020204" pitchFamily="34" charset="0"/>
+                          <a:ea typeface="Noto Serif CJK SC"/>
+                          <a:cs typeface="Arial" panose="020B0604020202020204" pitchFamily="34" charset="0"/>
+                        </a:rPr>
+                        <a:t>Schulung vor Ort</a:t>
+                      </a:r>
+                      <a:endParaRPr lang="de-DE" sz="1200" kern="100">
+                        <a:effectLst/>
+                        <a:latin typeface="Arial" panose="020B0604020202020204" pitchFamily="34" charset="0"/>
+                        <a:ea typeface="Noto Serif CJK SC"/>
+                        <a:cs typeface="Noto Sans Devanagari" panose="020B0502040504020204" pitchFamily="34" charset="0"/>
+                      </a:endParaRPr>
+                    </a:p>
+                  </a:txBody>
+                  <a:tcPr marL="68580" marR="68580" marT="0" marB="0"/>
+                </a:tc>
+                <a:tc>
+                  <a:txBody>
+                    <a:bodyPr/>
+                    <a:lstStyle/>
+                    <a:p>
+                      <a:pPr>
+                        <a:lnSpc>
+                          <a:spcPct val="115000"/>
+                        </a:lnSpc>
+                        <a:spcAft>
+                          <a:spcPts val="700"/>
+                        </a:spcAft>
+                        <a:buNone/>
+                      </a:pPr>
+                      <a:r>
+                        <a:rPr lang="de-DE" sz="1000" kern="100" dirty="0">
+                          <a:effectLst/>
+                          <a:latin typeface="Arial" panose="020B0604020202020204" pitchFamily="34" charset="0"/>
+                          <a:ea typeface="Noto Serif CJK SC"/>
+                          <a:cs typeface="Arial" panose="020B0604020202020204" pitchFamily="34" charset="0"/>
+                        </a:rPr>
+                        <a:t>Hardware und API</a:t>
+                      </a:r>
+                      <a:endParaRPr lang="de-DE" sz="1200" kern="100" dirty="0">
+                        <a:effectLst/>
+                        <a:latin typeface="Arial" panose="020B0604020202020204" pitchFamily="34" charset="0"/>
+                        <a:ea typeface="Noto Serif CJK SC"/>
+                        <a:cs typeface="Noto Sans Devanagari" panose="020B0502040504020204" pitchFamily="34" charset="0"/>
+                      </a:endParaRPr>
+                    </a:p>
+                  </a:txBody>
+                  <a:tcPr marL="68580" marR="68580" marT="0" marB="0"/>
+                </a:tc>
+                <a:tc>
+                  <a:txBody>
+                    <a:bodyPr/>
+                    <a:lstStyle/>
+                    <a:p>
+                      <a:pPr>
+                        <a:lnSpc>
+                          <a:spcPct val="115000"/>
+                        </a:lnSpc>
+                        <a:spcAft>
+                          <a:spcPts val="700"/>
+                        </a:spcAft>
+                        <a:buNone/>
+                      </a:pPr>
+                      <a:r>
+                        <a:rPr lang="de-DE" sz="1000" kern="100">
+                          <a:effectLst/>
+                          <a:latin typeface="Arial" panose="020B0604020202020204" pitchFamily="34" charset="0"/>
+                          <a:ea typeface="Noto Serif CJK SC"/>
+                          <a:cs typeface="Arial" panose="020B0604020202020204" pitchFamily="34" charset="0"/>
+                        </a:rPr>
+                        <a:t>1x vor Release</a:t>
+                      </a:r>
+                      <a:endParaRPr lang="de-DE" sz="1200" kern="100">
+                        <a:effectLst/>
+                        <a:latin typeface="Arial" panose="020B0604020202020204" pitchFamily="34" charset="0"/>
+                        <a:ea typeface="Noto Serif CJK SC"/>
+                        <a:cs typeface="Noto Sans Devanagari" panose="020B0502040504020204" pitchFamily="34" charset="0"/>
+                      </a:endParaRPr>
+                    </a:p>
+                    <a:p>
+                      <a:pPr>
+                        <a:lnSpc>
+                          <a:spcPct val="115000"/>
+                        </a:lnSpc>
+                        <a:spcAft>
+                          <a:spcPts val="700"/>
+                        </a:spcAft>
+                        <a:buNone/>
+                      </a:pPr>
+                      <a:r>
+                        <a:rPr lang="de-DE" sz="1000" kern="100">
+                          <a:effectLst/>
+                          <a:latin typeface="Arial" panose="020B0604020202020204" pitchFamily="34" charset="0"/>
+                          <a:ea typeface="Noto Serif CJK SC"/>
+                          <a:cs typeface="Arial" panose="020B0604020202020204" pitchFamily="34" charset="0"/>
+                        </a:rPr>
+                        <a:t>1x jährlich nach Release</a:t>
+                      </a:r>
+                      <a:endParaRPr lang="de-DE" sz="1200" kern="100">
+                        <a:effectLst/>
+                        <a:latin typeface="Arial" panose="020B0604020202020204" pitchFamily="34" charset="0"/>
+                        <a:ea typeface="Noto Serif CJK SC"/>
+                        <a:cs typeface="Noto Sans Devanagari" panose="020B0502040504020204" pitchFamily="34" charset="0"/>
+                      </a:endParaRPr>
+                    </a:p>
+                  </a:txBody>
+                  <a:tcPr marL="68580" marR="68580" marT="0" marB="0"/>
+                </a:tc>
+                <a:tc>
+                  <a:txBody>
+                    <a:bodyPr/>
+                    <a:lstStyle/>
+                    <a:p>
+                      <a:pPr>
+                        <a:lnSpc>
+                          <a:spcPct val="115000"/>
+                        </a:lnSpc>
+                        <a:spcAft>
+                          <a:spcPts val="700"/>
+                        </a:spcAft>
+                        <a:buNone/>
+                      </a:pPr>
+                      <a:r>
+                        <a:rPr lang="de-DE" sz="1000" kern="100">
+                          <a:effectLst/>
+                          <a:latin typeface="Arial" panose="020B0604020202020204" pitchFamily="34" charset="0"/>
+                          <a:ea typeface="Noto Serif CJK SC"/>
+                          <a:cs typeface="Arial" panose="020B0604020202020204" pitchFamily="34" charset="0"/>
+                        </a:rPr>
+                        <a:t>Vor Release: Entwickler</a:t>
+                      </a:r>
+                      <a:endParaRPr lang="de-DE" sz="1200" kern="100">
+                        <a:effectLst/>
+                        <a:latin typeface="Arial" panose="020B0604020202020204" pitchFamily="34" charset="0"/>
+                        <a:ea typeface="Noto Serif CJK SC"/>
+                        <a:cs typeface="Noto Sans Devanagari" panose="020B0502040504020204" pitchFamily="34" charset="0"/>
+                      </a:endParaRPr>
+                    </a:p>
+                    <a:p>
+                      <a:pPr>
+                        <a:lnSpc>
+                          <a:spcPct val="115000"/>
+                        </a:lnSpc>
+                        <a:spcAft>
+                          <a:spcPts val="700"/>
+                        </a:spcAft>
+                        <a:buNone/>
+                      </a:pPr>
+                      <a:r>
+                        <a:rPr lang="de-DE" sz="1000" kern="100">
+                          <a:effectLst/>
+                          <a:latin typeface="Arial" panose="020B0604020202020204" pitchFamily="34" charset="0"/>
+                          <a:ea typeface="Noto Serif CJK SC"/>
+                          <a:cs typeface="Arial" panose="020B0604020202020204" pitchFamily="34" charset="0"/>
+                        </a:rPr>
+                        <a:t>Nach Release:</a:t>
+                      </a:r>
+                      <a:endParaRPr lang="de-DE" sz="1200" kern="100">
+                        <a:effectLst/>
+                        <a:latin typeface="Arial" panose="020B0604020202020204" pitchFamily="34" charset="0"/>
+                        <a:ea typeface="Noto Serif CJK SC"/>
+                        <a:cs typeface="Noto Sans Devanagari" panose="020B0502040504020204" pitchFamily="34" charset="0"/>
+                      </a:endParaRPr>
+                    </a:p>
+                    <a:p>
+                      <a:pPr>
+                        <a:lnSpc>
+                          <a:spcPct val="115000"/>
+                        </a:lnSpc>
+                        <a:spcAft>
+                          <a:spcPts val="700"/>
+                        </a:spcAft>
+                        <a:buNone/>
+                      </a:pPr>
+                      <a:r>
+                        <a:rPr lang="de-DE" sz="1000" kern="100">
+                          <a:effectLst/>
+                          <a:latin typeface="Arial" panose="020B0604020202020204" pitchFamily="34" charset="0"/>
+                          <a:ea typeface="Noto Serif CJK SC"/>
+                          <a:cs typeface="Arial" panose="020B0604020202020204" pitchFamily="34" charset="0"/>
+                        </a:rPr>
+                        <a:t>Product Owner</a:t>
+                      </a:r>
+                      <a:endParaRPr lang="de-DE" sz="1200" kern="100">
+                        <a:effectLst/>
+                        <a:latin typeface="Arial" panose="020B0604020202020204" pitchFamily="34" charset="0"/>
+                        <a:ea typeface="Noto Serif CJK SC"/>
+                        <a:cs typeface="Noto Sans Devanagari" panose="020B0502040504020204" pitchFamily="34" charset="0"/>
+                      </a:endParaRPr>
+                    </a:p>
+                  </a:txBody>
+                  <a:tcPr marL="68580" marR="68580" marT="0" marB="0"/>
+                </a:tc>
+                <a:extLst>
+                  <a:ext uri="{0D108BD9-81ED-4DB2-BD59-A6C34878D82A}">
+                    <a16:rowId xmlns:a16="http://schemas.microsoft.com/office/drawing/2014/main" val="4123259550"/>
+                  </a:ext>
+                </a:extLst>
+              </a:tr>
+              <a:tr h="585399">
+                <a:tc>
+                  <a:txBody>
+                    <a:bodyPr/>
+                    <a:lstStyle/>
+                    <a:p>
+                      <a:pPr>
+                        <a:lnSpc>
+                          <a:spcPct val="115000"/>
+                        </a:lnSpc>
+                        <a:spcAft>
+                          <a:spcPts val="700"/>
+                        </a:spcAft>
+                        <a:buNone/>
+                      </a:pPr>
+                      <a:r>
+                        <a:rPr lang="de-DE" sz="1000" kern="100">
+                          <a:effectLst/>
+                          <a:latin typeface="Arial" panose="020B0604020202020204" pitchFamily="34" charset="0"/>
+                          <a:ea typeface="Noto Serif CJK SC"/>
+                          <a:cs typeface="Arial" panose="020B0604020202020204" pitchFamily="34" charset="0"/>
+                        </a:rPr>
+                        <a:t>HR-Abteilung</a:t>
+                      </a:r>
+                      <a:endParaRPr lang="de-DE" sz="1200" kern="100">
+                        <a:effectLst/>
+                        <a:latin typeface="Arial" panose="020B0604020202020204" pitchFamily="34" charset="0"/>
+                        <a:ea typeface="Noto Serif CJK SC"/>
+                        <a:cs typeface="Noto Sans Devanagari" panose="020B0502040504020204" pitchFamily="34" charset="0"/>
+                      </a:endParaRPr>
+                    </a:p>
+                  </a:txBody>
+                  <a:tcPr marL="68580" marR="68580" marT="0" marB="0"/>
+                </a:tc>
+                <a:tc>
+                  <a:txBody>
+                    <a:bodyPr/>
+                    <a:lstStyle/>
+                    <a:p>
+                      <a:pPr>
+                        <a:lnSpc>
+                          <a:spcPct val="115000"/>
+                        </a:lnSpc>
+                        <a:spcAft>
+                          <a:spcPts val="700"/>
+                        </a:spcAft>
+                        <a:buNone/>
+                      </a:pPr>
+                      <a:r>
+                        <a:rPr lang="de-DE" sz="1000" kern="100">
+                          <a:effectLst/>
+                          <a:latin typeface="Arial" panose="020B0604020202020204" pitchFamily="34" charset="0"/>
+                          <a:ea typeface="Noto Serif CJK SC"/>
+                          <a:cs typeface="Arial" panose="020B0604020202020204" pitchFamily="34" charset="0"/>
+                        </a:rPr>
+                        <a:t>Präsentation</a:t>
+                      </a:r>
+                      <a:endParaRPr lang="de-DE" sz="1200" kern="100">
+                        <a:effectLst/>
+                        <a:latin typeface="Arial" panose="020B0604020202020204" pitchFamily="34" charset="0"/>
+                        <a:ea typeface="Noto Serif CJK SC"/>
+                        <a:cs typeface="Noto Sans Devanagari" panose="020B0502040504020204" pitchFamily="34" charset="0"/>
+                      </a:endParaRPr>
+                    </a:p>
+                  </a:txBody>
+                  <a:tcPr marL="68580" marR="68580" marT="0" marB="0"/>
+                </a:tc>
+                <a:tc>
+                  <a:txBody>
+                    <a:bodyPr/>
+                    <a:lstStyle/>
+                    <a:p>
+                      <a:pPr>
+                        <a:lnSpc>
+                          <a:spcPct val="115000"/>
+                        </a:lnSpc>
+                        <a:spcAft>
+                          <a:spcPts val="700"/>
+                        </a:spcAft>
+                        <a:buNone/>
+                      </a:pPr>
+                      <a:r>
+                        <a:rPr lang="de-DE" sz="1000" kern="100" dirty="0">
+                          <a:effectLst/>
+                          <a:latin typeface="Arial" panose="020B0604020202020204" pitchFamily="34" charset="0"/>
+                          <a:ea typeface="Noto Serif CJK SC"/>
+                          <a:cs typeface="Arial" panose="020B0604020202020204" pitchFamily="34" charset="0"/>
+                        </a:rPr>
+                        <a:t>Control-Panel</a:t>
+                      </a:r>
+                      <a:endParaRPr lang="de-DE" sz="1200" kern="100" dirty="0">
+                        <a:effectLst/>
+                        <a:latin typeface="Arial" panose="020B0604020202020204" pitchFamily="34" charset="0"/>
+                        <a:ea typeface="Noto Serif CJK SC"/>
+                        <a:cs typeface="Noto Sans Devanagari" panose="020B0502040504020204" pitchFamily="34" charset="0"/>
+                      </a:endParaRPr>
+                    </a:p>
+                  </a:txBody>
+                  <a:tcPr marL="68580" marR="68580" marT="0" marB="0"/>
+                </a:tc>
+                <a:tc>
+                  <a:txBody>
+                    <a:bodyPr/>
+                    <a:lstStyle/>
+                    <a:p>
+                      <a:pPr>
+                        <a:lnSpc>
+                          <a:spcPct val="115000"/>
+                        </a:lnSpc>
+                        <a:spcAft>
+                          <a:spcPts val="700"/>
+                        </a:spcAft>
+                        <a:buNone/>
+                      </a:pPr>
+                      <a:r>
+                        <a:rPr lang="de-DE" sz="1000" kern="100">
+                          <a:effectLst/>
+                          <a:latin typeface="Arial" panose="020B0604020202020204" pitchFamily="34" charset="0"/>
+                          <a:ea typeface="Noto Serif CJK SC"/>
+                          <a:cs typeface="Arial" panose="020B0604020202020204" pitchFamily="34" charset="0"/>
+                        </a:rPr>
+                        <a:t>2x vor Release</a:t>
+                      </a:r>
+                      <a:endParaRPr lang="de-DE" sz="1200" kern="100">
+                        <a:effectLst/>
+                        <a:latin typeface="Arial" panose="020B0604020202020204" pitchFamily="34" charset="0"/>
+                        <a:ea typeface="Noto Serif CJK SC"/>
+                        <a:cs typeface="Noto Sans Devanagari" panose="020B0502040504020204" pitchFamily="34" charset="0"/>
+                      </a:endParaRPr>
+                    </a:p>
+                    <a:p>
+                      <a:pPr>
+                        <a:lnSpc>
+                          <a:spcPct val="115000"/>
+                        </a:lnSpc>
+                        <a:spcAft>
+                          <a:spcPts val="700"/>
+                        </a:spcAft>
+                        <a:buNone/>
+                      </a:pPr>
+                      <a:r>
+                        <a:rPr lang="de-DE" sz="1000" kern="100">
+                          <a:effectLst/>
+                          <a:latin typeface="Arial" panose="020B0604020202020204" pitchFamily="34" charset="0"/>
+                          <a:ea typeface="Noto Serif CJK SC"/>
+                          <a:cs typeface="Arial" panose="020B0604020202020204" pitchFamily="34" charset="0"/>
+                        </a:rPr>
+                        <a:t>1x im Quartal</a:t>
+                      </a:r>
+                      <a:endParaRPr lang="de-DE" sz="1200" kern="100">
+                        <a:effectLst/>
+                        <a:latin typeface="Arial" panose="020B0604020202020204" pitchFamily="34" charset="0"/>
+                        <a:ea typeface="Noto Serif CJK SC"/>
+                        <a:cs typeface="Noto Sans Devanagari" panose="020B0502040504020204" pitchFamily="34" charset="0"/>
+                      </a:endParaRPr>
+                    </a:p>
+                  </a:txBody>
+                  <a:tcPr marL="68580" marR="68580" marT="0" marB="0"/>
+                </a:tc>
+                <a:tc>
+                  <a:txBody>
+                    <a:bodyPr/>
+                    <a:lstStyle/>
+                    <a:p>
+                      <a:pPr>
+                        <a:lnSpc>
+                          <a:spcPct val="115000"/>
+                        </a:lnSpc>
+                        <a:spcAft>
+                          <a:spcPts val="700"/>
+                        </a:spcAft>
+                        <a:buNone/>
+                      </a:pPr>
+                      <a:r>
+                        <a:rPr lang="de-DE" sz="1000" kern="100">
+                          <a:effectLst/>
+                          <a:latin typeface="Arial" panose="020B0604020202020204" pitchFamily="34" charset="0"/>
+                          <a:ea typeface="Noto Serif CJK SC"/>
+                          <a:cs typeface="Arial" panose="020B0604020202020204" pitchFamily="34" charset="0"/>
+                        </a:rPr>
+                        <a:t>Product Owner / Scrum Master</a:t>
+                      </a:r>
+                      <a:endParaRPr lang="de-DE" sz="1200" kern="100">
+                        <a:effectLst/>
+                        <a:latin typeface="Arial" panose="020B0604020202020204" pitchFamily="34" charset="0"/>
+                        <a:ea typeface="Noto Serif CJK SC"/>
+                        <a:cs typeface="Noto Sans Devanagari" panose="020B0502040504020204" pitchFamily="34" charset="0"/>
+                      </a:endParaRPr>
+                    </a:p>
+                  </a:txBody>
+                  <a:tcPr marL="68580" marR="68580" marT="0" marB="0"/>
+                </a:tc>
+                <a:extLst>
+                  <a:ext uri="{0D108BD9-81ED-4DB2-BD59-A6C34878D82A}">
+                    <a16:rowId xmlns:a16="http://schemas.microsoft.com/office/drawing/2014/main" val="126354763"/>
+                  </a:ext>
+                </a:extLst>
+              </a:tr>
+              <a:tr h="704492">
+                <a:tc>
+                  <a:txBody>
+                    <a:bodyPr/>
+                    <a:lstStyle/>
+                    <a:p>
+                      <a:pPr>
+                        <a:lnSpc>
+                          <a:spcPct val="115000"/>
+                        </a:lnSpc>
+                        <a:spcAft>
+                          <a:spcPts val="700"/>
+                        </a:spcAft>
+                        <a:buNone/>
+                      </a:pPr>
+                      <a:r>
+                        <a:rPr lang="de-DE" sz="1000" kern="100">
+                          <a:effectLst/>
+                          <a:latin typeface="Arial" panose="020B0604020202020204" pitchFamily="34" charset="0"/>
+                          <a:ea typeface="Noto Serif CJK SC"/>
+                          <a:cs typeface="Arial" panose="020B0604020202020204" pitchFamily="34" charset="0"/>
+                        </a:rPr>
+                        <a:t>Geschäftsführung</a:t>
+                      </a:r>
+                      <a:endParaRPr lang="de-DE" sz="1200" kern="100">
+                        <a:effectLst/>
+                        <a:latin typeface="Arial" panose="020B0604020202020204" pitchFamily="34" charset="0"/>
+                        <a:ea typeface="Noto Serif CJK SC"/>
+                        <a:cs typeface="Noto Sans Devanagari" panose="020B0502040504020204" pitchFamily="34" charset="0"/>
+                      </a:endParaRPr>
+                    </a:p>
+                  </a:txBody>
+                  <a:tcPr marL="68580" marR="68580" marT="0" marB="0"/>
+                </a:tc>
+                <a:tc>
+                  <a:txBody>
+                    <a:bodyPr/>
+                    <a:lstStyle/>
+                    <a:p>
+                      <a:pPr>
+                        <a:lnSpc>
+                          <a:spcPct val="115000"/>
+                        </a:lnSpc>
+                        <a:spcAft>
+                          <a:spcPts val="700"/>
+                        </a:spcAft>
+                        <a:buNone/>
+                      </a:pPr>
+                      <a:r>
+                        <a:rPr lang="de-DE" sz="1000" kern="100">
+                          <a:effectLst/>
+                          <a:latin typeface="Arial" panose="020B0604020202020204" pitchFamily="34" charset="0"/>
+                          <a:ea typeface="Noto Serif CJK SC"/>
+                          <a:cs typeface="Arial" panose="020B0604020202020204" pitchFamily="34" charset="0"/>
+                        </a:rPr>
+                        <a:t>Präsentation vor Ort</a:t>
+                      </a:r>
+                      <a:endParaRPr lang="de-DE" sz="1200" kern="100">
+                        <a:effectLst/>
+                        <a:latin typeface="Arial" panose="020B0604020202020204" pitchFamily="34" charset="0"/>
+                        <a:ea typeface="Noto Serif CJK SC"/>
+                        <a:cs typeface="Noto Sans Devanagari" panose="020B0502040504020204" pitchFamily="34" charset="0"/>
+                      </a:endParaRPr>
+                    </a:p>
+                  </a:txBody>
+                  <a:tcPr marL="68580" marR="68580" marT="0" marB="0"/>
+                </a:tc>
+                <a:tc>
+                  <a:txBody>
+                    <a:bodyPr/>
+                    <a:lstStyle/>
+                    <a:p>
+                      <a:pPr>
+                        <a:lnSpc>
+                          <a:spcPct val="115000"/>
+                        </a:lnSpc>
+                        <a:spcAft>
+                          <a:spcPts val="700"/>
+                        </a:spcAft>
+                        <a:buNone/>
+                      </a:pPr>
+                      <a:r>
+                        <a:rPr lang="de-DE" sz="1000" kern="100" dirty="0">
+                          <a:effectLst/>
+                          <a:latin typeface="Arial" panose="020B0604020202020204" pitchFamily="34" charset="0"/>
+                          <a:ea typeface="Noto Serif CJK SC"/>
+                          <a:cs typeface="Arial" panose="020B0604020202020204" pitchFamily="34" charset="0"/>
+                        </a:rPr>
+                        <a:t>Control-Panel, Source Code, API</a:t>
+                      </a:r>
+                      <a:endParaRPr lang="de-DE" sz="1200" kern="100" dirty="0">
+                        <a:effectLst/>
+                        <a:latin typeface="Arial" panose="020B0604020202020204" pitchFamily="34" charset="0"/>
+                        <a:ea typeface="Noto Serif CJK SC"/>
+                        <a:cs typeface="Noto Sans Devanagari" panose="020B0502040504020204" pitchFamily="34" charset="0"/>
+                      </a:endParaRPr>
+                    </a:p>
+                  </a:txBody>
+                  <a:tcPr marL="68580" marR="68580" marT="0" marB="0"/>
+                </a:tc>
+                <a:tc>
+                  <a:txBody>
+                    <a:bodyPr/>
+                    <a:lstStyle/>
+                    <a:p>
+                      <a:pPr>
+                        <a:lnSpc>
+                          <a:spcPct val="115000"/>
+                        </a:lnSpc>
+                        <a:spcAft>
+                          <a:spcPts val="700"/>
+                        </a:spcAft>
+                        <a:buNone/>
+                      </a:pPr>
+                      <a:r>
+                        <a:rPr lang="de-DE" sz="1000" kern="100">
+                          <a:effectLst/>
+                          <a:latin typeface="Arial" panose="020B0604020202020204" pitchFamily="34" charset="0"/>
+                          <a:ea typeface="Noto Serif CJK SC"/>
+                          <a:cs typeface="Arial" panose="020B0604020202020204" pitchFamily="34" charset="0"/>
+                        </a:rPr>
+                        <a:t>1x vor Release</a:t>
+                      </a:r>
+                      <a:endParaRPr lang="de-DE" sz="1200" kern="100">
+                        <a:effectLst/>
+                        <a:latin typeface="Arial" panose="020B0604020202020204" pitchFamily="34" charset="0"/>
+                        <a:ea typeface="Noto Serif CJK SC"/>
+                        <a:cs typeface="Noto Sans Devanagari" panose="020B0502040504020204" pitchFamily="34" charset="0"/>
+                      </a:endParaRPr>
+                    </a:p>
+                    <a:p>
+                      <a:pPr>
+                        <a:lnSpc>
+                          <a:spcPct val="115000"/>
+                        </a:lnSpc>
+                        <a:spcAft>
+                          <a:spcPts val="700"/>
+                        </a:spcAft>
+                        <a:buNone/>
+                      </a:pPr>
+                      <a:r>
+                        <a:rPr lang="de-DE" sz="1000" kern="100">
+                          <a:effectLst/>
+                          <a:latin typeface="Arial" panose="020B0604020202020204" pitchFamily="34" charset="0"/>
+                          <a:ea typeface="Noto Serif CJK SC"/>
+                          <a:cs typeface="Arial" panose="020B0604020202020204" pitchFamily="34" charset="0"/>
+                        </a:rPr>
+                        <a:t>Nach Bedarf</a:t>
+                      </a:r>
+                      <a:endParaRPr lang="de-DE" sz="1200" kern="100">
+                        <a:effectLst/>
+                        <a:latin typeface="Arial" panose="020B0604020202020204" pitchFamily="34" charset="0"/>
+                        <a:ea typeface="Noto Serif CJK SC"/>
+                        <a:cs typeface="Noto Sans Devanagari" panose="020B0502040504020204" pitchFamily="34" charset="0"/>
+                      </a:endParaRPr>
+                    </a:p>
+                  </a:txBody>
+                  <a:tcPr marL="68580" marR="68580" marT="0" marB="0"/>
+                </a:tc>
+                <a:tc>
+                  <a:txBody>
+                    <a:bodyPr/>
+                    <a:lstStyle/>
+                    <a:p>
+                      <a:pPr>
+                        <a:lnSpc>
+                          <a:spcPct val="115000"/>
+                        </a:lnSpc>
+                        <a:spcAft>
+                          <a:spcPts val="700"/>
+                        </a:spcAft>
+                        <a:buNone/>
+                      </a:pPr>
+                      <a:r>
+                        <a:rPr lang="de-DE" sz="1000" kern="100" dirty="0" err="1">
+                          <a:effectLst/>
+                          <a:latin typeface="Arial" panose="020B0604020202020204" pitchFamily="34" charset="0"/>
+                          <a:ea typeface="Noto Serif CJK SC"/>
+                          <a:cs typeface="Arial" panose="020B0604020202020204" pitchFamily="34" charset="0"/>
+                        </a:rPr>
+                        <a:t>Product</a:t>
+                      </a:r>
+                      <a:r>
+                        <a:rPr lang="de-DE" sz="1000" kern="100" dirty="0">
+                          <a:effectLst/>
+                          <a:latin typeface="Arial" panose="020B0604020202020204" pitchFamily="34" charset="0"/>
+                          <a:ea typeface="Noto Serif CJK SC"/>
+                          <a:cs typeface="Arial" panose="020B0604020202020204" pitchFamily="34" charset="0"/>
+                        </a:rPr>
+                        <a:t> </a:t>
+                      </a:r>
+                      <a:r>
+                        <a:rPr lang="de-DE" sz="1000" kern="100" dirty="0" err="1">
+                          <a:effectLst/>
+                          <a:latin typeface="Arial" panose="020B0604020202020204" pitchFamily="34" charset="0"/>
+                          <a:ea typeface="Noto Serif CJK SC"/>
+                          <a:cs typeface="Arial" panose="020B0604020202020204" pitchFamily="34" charset="0"/>
+                        </a:rPr>
+                        <a:t>Owner</a:t>
+                      </a:r>
+                      <a:r>
+                        <a:rPr lang="de-DE" sz="1000" kern="100" dirty="0">
+                          <a:effectLst/>
+                          <a:latin typeface="Arial" panose="020B0604020202020204" pitchFamily="34" charset="0"/>
+                          <a:ea typeface="Noto Serif CJK SC"/>
+                          <a:cs typeface="Arial" panose="020B0604020202020204" pitchFamily="34" charset="0"/>
+                        </a:rPr>
+                        <a:t>, </a:t>
+                      </a:r>
+                      <a:r>
+                        <a:rPr lang="de-DE" sz="1000" kern="100" dirty="0" err="1">
+                          <a:effectLst/>
+                          <a:latin typeface="Arial" panose="020B0604020202020204" pitchFamily="34" charset="0"/>
+                          <a:ea typeface="Noto Serif CJK SC"/>
+                          <a:cs typeface="Arial" panose="020B0604020202020204" pitchFamily="34" charset="0"/>
+                        </a:rPr>
+                        <a:t>Scrum</a:t>
+                      </a:r>
+                      <a:r>
+                        <a:rPr lang="de-DE" sz="1000" kern="100" dirty="0">
+                          <a:effectLst/>
+                          <a:latin typeface="Arial" panose="020B0604020202020204" pitchFamily="34" charset="0"/>
+                          <a:ea typeface="Noto Serif CJK SC"/>
+                          <a:cs typeface="Arial" panose="020B0604020202020204" pitchFamily="34" charset="0"/>
+                        </a:rPr>
+                        <a:t> Master, Entwickler</a:t>
+                      </a:r>
+                      <a:endParaRPr lang="de-DE" sz="1200" kern="100" dirty="0">
+                        <a:effectLst/>
+                        <a:latin typeface="Arial" panose="020B0604020202020204" pitchFamily="34" charset="0"/>
+                        <a:ea typeface="Noto Serif CJK SC"/>
+                        <a:cs typeface="Noto Sans Devanagari" panose="020B0502040504020204" pitchFamily="34" charset="0"/>
+                      </a:endParaRPr>
+                    </a:p>
+                  </a:txBody>
+                  <a:tcPr marL="68580" marR="68580" marT="0" marB="0"/>
+                </a:tc>
+                <a:extLst>
+                  <a:ext uri="{0D108BD9-81ED-4DB2-BD59-A6C34878D82A}">
+                    <a16:rowId xmlns:a16="http://schemas.microsoft.com/office/drawing/2014/main" val="465764768"/>
+                  </a:ext>
+                </a:extLst>
+              </a:tr>
+            </a:tbl>
+          </a:graphicData>
+        </a:graphic>
+      </p:graphicFrame>
+      <p:sp>
+        <p:nvSpPr>
+          <p:cNvPr id="5" name="Textfeld 4">
+            <a:extLst>
+              <a:ext uri="{FF2B5EF4-FFF2-40B4-BE49-F238E27FC236}">
+                <a16:creationId xmlns:a16="http://schemas.microsoft.com/office/drawing/2014/main" id="{8B3F9813-857E-B452-4887-5FB468DBF3EC}"/>
+              </a:ext>
+            </a:extLst>
+          </p:cNvPr>
+          <p:cNvSpPr txBox="1"/>
+          <p:nvPr/>
+        </p:nvSpPr>
+        <p:spPr>
+          <a:xfrm>
+            <a:off x="1374328" y="2512750"/>
+            <a:ext cx="2625975" cy="2677656"/>
+          </a:xfrm>
+          <a:prstGeom prst="rect">
+            <a:avLst/>
+          </a:prstGeom>
+          <a:noFill/>
+        </p:spPr>
+        <p:txBody>
+          <a:bodyPr wrap="none" rtlCol="0">
+            <a:spAutoFit/>
+          </a:bodyPr>
+          <a:lstStyle/>
+          <a:p>
+            <a:r>
+              <a:rPr lang="de-DE" sz="2400" b="1" dirty="0"/>
+              <a:t>Grundschulung:</a:t>
+            </a:r>
+          </a:p>
+          <a:p>
+            <a:endParaRPr lang="de-DE" dirty="0"/>
+          </a:p>
+          <a:p>
+            <a:pPr marL="285750" indent="-285750">
+              <a:lnSpc>
+                <a:spcPct val="150000"/>
+              </a:lnSpc>
+              <a:buFont typeface="Arial" panose="020B0604020202020204" pitchFamily="34" charset="0"/>
+              <a:buChar char="•"/>
+            </a:pPr>
+            <a:r>
+              <a:rPr lang="de-DE" dirty="0"/>
+              <a:t>Ändern der Sprache</a:t>
+            </a:r>
+          </a:p>
+          <a:p>
+            <a:pPr marL="285750" indent="-285750">
+              <a:lnSpc>
+                <a:spcPct val="150000"/>
+              </a:lnSpc>
+              <a:buFont typeface="Arial" panose="020B0604020202020204" pitchFamily="34" charset="0"/>
+              <a:buChar char="•"/>
+            </a:pPr>
+            <a:r>
+              <a:rPr lang="de-DE" dirty="0"/>
+              <a:t>Ändern des Passworts</a:t>
+            </a:r>
+          </a:p>
+          <a:p>
+            <a:pPr marL="285750" indent="-285750">
+              <a:lnSpc>
+                <a:spcPct val="150000"/>
+              </a:lnSpc>
+              <a:buFont typeface="Arial" panose="020B0604020202020204" pitchFamily="34" charset="0"/>
+              <a:buChar char="•"/>
+            </a:pPr>
+            <a:r>
+              <a:rPr lang="de-DE" dirty="0"/>
+              <a:t>First </a:t>
+            </a:r>
+            <a:r>
+              <a:rPr lang="de-DE" dirty="0" err="1"/>
+              <a:t>Steps</a:t>
+            </a:r>
+            <a:endParaRPr lang="de-DE" dirty="0"/>
+          </a:p>
+          <a:p>
+            <a:pPr marL="285750" indent="-285750">
+              <a:lnSpc>
+                <a:spcPct val="150000"/>
+              </a:lnSpc>
+              <a:buFont typeface="Arial" panose="020B0604020202020204" pitchFamily="34" charset="0"/>
+              <a:buChar char="•"/>
+            </a:pPr>
+            <a:r>
+              <a:rPr lang="de-DE" dirty="0"/>
+              <a:t>Funktionen</a:t>
+            </a:r>
+          </a:p>
+          <a:p>
+            <a:pPr marL="285750" indent="-285750">
+              <a:buFont typeface="Arial" panose="020B0604020202020204" pitchFamily="34" charset="0"/>
+              <a:buChar char="•"/>
+            </a:pPr>
+            <a:endParaRPr lang="de-DE" dirty="0"/>
+          </a:p>
+        </p:txBody>
+      </p:sp>
+    </p:spTree>
+    <p:extLst>
+      <p:ext uri="{BB962C8B-B14F-4D97-AF65-F5344CB8AC3E}">
+        <p14:creationId xmlns:p14="http://schemas.microsoft.com/office/powerpoint/2010/main" val="647762184"/>
+      </p:ext>
+    </p:extLst>
+  </p:cSld>
+  <p:clrMapOvr>
+    <a:masterClrMapping/>
+  </p:clrMapOvr>
+</p:sld>
+</file>
+
+<file path=ppt/slides/slide18.xml><?xml version="1.0" encoding="utf-8"?>
 <p:sld xmlns:a="http://schemas.openxmlformats.org/drawingml/2006/main" xmlns:r="http://schemas.openxmlformats.org/officeDocument/2006/relationships" xmlns:p="http://schemas.openxmlformats.org/presentationml/2006/main">
   <p:cSld>
     <p:bg>
@@ -15252,7 +17881,7 @@
 </p:sld>
 </file>
 
-<file path=ppt/slides/slide18.xml><?xml version="1.0" encoding="utf-8"?>
+<file path=ppt/slides/slide19.xml><?xml version="1.0" encoding="utf-8"?>
 <p:sld xmlns:a="http://schemas.openxmlformats.org/drawingml/2006/main" xmlns:r="http://schemas.openxmlformats.org/officeDocument/2006/relationships" xmlns:p="http://schemas.openxmlformats.org/presentationml/2006/main">
   <p:cSld>
     <p:bg>
@@ -15572,610 +18201,6 @@
               </a:rPr>
               <a:t>Benutzer löschen</a:t>
             </a:r>
-          </a:p>
-          <a:p>
-            <a:pPr indent="0" defTabSz="914400">
-              <a:lnSpc>
-                <a:spcPct val="110000"/>
-              </a:lnSpc>
-              <a:spcBef>
-                <a:spcPts val="1001"/>
-              </a:spcBef>
-              <a:buNone/>
-            </a:pPr>
-            <a:endParaRPr lang="de-DE" sz="2000" b="0" u="none" strike="noStrike">
-              <a:solidFill>
-                <a:schemeClr val="dk1"/>
-              </a:solidFill>
-              <a:effectLst/>
-              <a:uFillTx/>
-              <a:latin typeface="Calisto MT"/>
-            </a:endParaRPr>
-          </a:p>
-          <a:p>
-            <a:pPr indent="0" defTabSz="914400">
-              <a:lnSpc>
-                <a:spcPct val="110000"/>
-              </a:lnSpc>
-              <a:spcBef>
-                <a:spcPts val="1001"/>
-              </a:spcBef>
-              <a:buNone/>
-            </a:pPr>
-            <a:endParaRPr lang="de-DE" sz="2000" b="0" u="none" strike="noStrike">
-              <a:solidFill>
-                <a:schemeClr val="dk1"/>
-              </a:solidFill>
-              <a:effectLst/>
-              <a:uFillTx/>
-              <a:latin typeface="Calisto MT"/>
-            </a:endParaRPr>
-          </a:p>
-          <a:p>
-            <a:pPr indent="0" defTabSz="914400">
-              <a:lnSpc>
-                <a:spcPct val="110000"/>
-              </a:lnSpc>
-              <a:spcBef>
-                <a:spcPts val="1001"/>
-              </a:spcBef>
-              <a:buNone/>
-            </a:pPr>
-            <a:endParaRPr lang="de-DE" sz="2000" b="0" u="none" strike="noStrike">
-              <a:solidFill>
-                <a:schemeClr val="dk1"/>
-              </a:solidFill>
-              <a:effectLst/>
-              <a:uFillTx/>
-              <a:latin typeface="Calisto MT"/>
-            </a:endParaRPr>
-          </a:p>
-          <a:p>
-            <a:pPr indent="0" defTabSz="914400">
-              <a:lnSpc>
-                <a:spcPct val="110000"/>
-              </a:lnSpc>
-              <a:spcBef>
-                <a:spcPts val="1001"/>
-              </a:spcBef>
-              <a:buNone/>
-            </a:pPr>
-            <a:endParaRPr lang="de-DE" sz="2000" b="0" u="none" strike="noStrike">
-              <a:solidFill>
-                <a:schemeClr val="dk1"/>
-              </a:solidFill>
-              <a:effectLst/>
-              <a:uFillTx/>
-              <a:latin typeface="Calisto MT"/>
-            </a:endParaRPr>
-          </a:p>
-        </p:txBody>
-      </p:sp>
-    </p:spTree>
-  </p:cSld>
-  <p:clrMapOvr>
-    <a:masterClrMapping/>
-  </p:clrMapOvr>
-</p:sld>
-</file>
-
-<file path=ppt/slides/slide19.xml><?xml version="1.0" encoding="utf-8"?>
-<p:sld xmlns:a="http://schemas.openxmlformats.org/drawingml/2006/main" xmlns:r="http://schemas.openxmlformats.org/officeDocument/2006/relationships" xmlns:p="http://schemas.openxmlformats.org/presentationml/2006/main">
-  <p:cSld>
-    <p:bg>
-      <p:bgPr>
-        <a:solidFill>
-          <a:schemeClr val="lt1"/>
-        </a:solidFill>
-        <a:effectLst/>
-      </p:bgPr>
-    </p:bg>
-    <p:spTree>
-      <p:nvGrpSpPr>
-        <p:cNvPr id="1" name=""/>
-        <p:cNvGrpSpPr/>
-        <p:nvPr/>
-      </p:nvGrpSpPr>
-      <p:grpSpPr>
-        <a:xfrm>
-          <a:off x="0" y="0"/>
-          <a:ext cx="0" cy="0"/>
-          <a:chOff x="0" y="0"/>
-          <a:chExt cx="0" cy="0"/>
-        </a:xfrm>
-      </p:grpSpPr>
-      <p:sp useBgFill="1">
-        <p:nvSpPr>
-          <p:cNvPr id="157" name="Rectangle 9">
-            <a:extLst>
-              <a:ext uri="{C183D7F6-B498-43B3-948B-1728B52AA6E4}">
-                <adec:decorative xmlns:adec="http://schemas.microsoft.com/office/drawing/2017/decorative" val="1"/>
-              </a:ext>
-            </a:extLst>
-          </p:cNvPr>
-          <p:cNvSpPr/>
-          <p:nvPr/>
-        </p:nvSpPr>
-        <p:spPr>
-          <a:xfrm>
-            <a:off x="0" y="0"/>
-            <a:ext cx="12191760" cy="6857640"/>
-          </a:xfrm>
-          <a:prstGeom prst="rect">
-            <a:avLst/>
-          </a:prstGeom>
-          <a:ln>
-            <a:noFill/>
-          </a:ln>
-        </p:spPr>
-        <p:style>
-          <a:lnRef idx="2">
-            <a:schemeClr val="accent1">
-              <a:shade val="50000"/>
-            </a:schemeClr>
-          </a:lnRef>
-          <a:fillRef idx="1">
-            <a:schemeClr val="accent1"/>
-          </a:fillRef>
-          <a:effectRef idx="0">
-            <a:schemeClr val="accent1"/>
-          </a:effectRef>
-          <a:fontRef idx="minor"/>
-        </p:style>
-        <p:txBody>
-          <a:bodyPr lIns="90000" tIns="45000" rIns="90000" bIns="45000" anchor="ctr">
-            <a:noAutofit/>
-          </a:bodyPr>
-          <a:lstStyle/>
-          <a:p>
-            <a:endParaRPr lang="en-US" sz="1800" b="0" u="none" strike="noStrike">
-              <a:solidFill>
-                <a:schemeClr val="lt1"/>
-              </a:solidFill>
-              <a:effectLst/>
-              <a:uFillTx/>
-              <a:latin typeface="Calisto MT"/>
-            </a:endParaRPr>
-          </a:p>
-        </p:txBody>
-      </p:sp>
-      <p:sp>
-        <p:nvSpPr>
-          <p:cNvPr id="158" name="PlaceHolder 1"/>
-          <p:cNvSpPr>
-            <a:spLocks noGrp="1"/>
-          </p:cNvSpPr>
-          <p:nvPr>
-            <p:ph type="title"/>
-          </p:nvPr>
-        </p:nvSpPr>
-        <p:spPr>
-          <a:xfrm>
-            <a:off x="704160" y="555840"/>
-            <a:ext cx="10815840" cy="2390400"/>
-          </a:xfrm>
-          <a:prstGeom prst="rect">
-            <a:avLst/>
-          </a:prstGeom>
-          <a:noFill/>
-          <a:ln w="0">
-            <a:noFill/>
-          </a:ln>
-        </p:spPr>
-        <p:txBody>
-          <a:bodyPr lIns="91440" tIns="45720" rIns="91440" bIns="45720" anchor="t">
-            <a:normAutofit/>
-          </a:bodyPr>
-          <a:lstStyle/>
-          <a:p>
-            <a:pPr indent="0" defTabSz="914400">
-              <a:lnSpc>
-                <a:spcPct val="100000"/>
-              </a:lnSpc>
-              <a:buNone/>
-            </a:pPr>
-            <a:r>
-              <a:rPr lang="de-DE" sz="4000" b="0" u="none" strike="noStrike" cap="all" spc="31" dirty="0">
-                <a:solidFill>
-                  <a:schemeClr val="dk1"/>
-                </a:solidFill>
-                <a:effectLst/>
-                <a:uFillTx/>
-                <a:latin typeface="Univers Condensed"/>
-              </a:rPr>
-              <a:t>8. Live Demo – User Dashboard</a:t>
-            </a:r>
-            <a:endParaRPr lang="de-DE" sz="4000" b="0" u="none" strike="noStrike" dirty="0">
-              <a:solidFill>
-                <a:schemeClr val="dk1"/>
-              </a:solidFill>
-              <a:effectLst/>
-              <a:uFillTx/>
-              <a:latin typeface="Calisto MT"/>
-            </a:endParaRPr>
-          </a:p>
-        </p:txBody>
-      </p:sp>
-      <p:sp>
-        <p:nvSpPr>
-          <p:cNvPr id="159" name="PlaceHolder 2"/>
-          <p:cNvSpPr>
-            <a:spLocks noGrp="1"/>
-          </p:cNvSpPr>
-          <p:nvPr>
-            <p:ph/>
-          </p:nvPr>
-        </p:nvSpPr>
-        <p:spPr>
-          <a:xfrm>
-            <a:off x="720000" y="1440000"/>
-            <a:ext cx="10772280" cy="4730040"/>
-          </a:xfrm>
-          <a:prstGeom prst="rect">
-            <a:avLst/>
-          </a:prstGeom>
-          <a:noFill/>
-          <a:ln w="0">
-            <a:noFill/>
-          </a:ln>
-        </p:spPr>
-        <p:txBody>
-          <a:bodyPr lIns="91440" tIns="45720" rIns="91440" bIns="45720" anchor="t">
-            <a:normAutofit fontScale="70000" lnSpcReduction="20000"/>
-          </a:bodyPr>
-          <a:lstStyle/>
-          <a:p>
-            <a:pPr marL="228600" indent="0" defTabSz="914400">
-              <a:lnSpc>
-                <a:spcPct val="110000"/>
-              </a:lnSpc>
-              <a:spcBef>
-                <a:spcPts val="1001"/>
-              </a:spcBef>
-              <a:buNone/>
-            </a:pPr>
-            <a:endParaRPr lang="de-DE" sz="2000" b="0" u="none" strike="noStrike">
-              <a:solidFill>
-                <a:schemeClr val="dk1"/>
-              </a:solidFill>
-              <a:effectLst/>
-              <a:uFillTx/>
-              <a:latin typeface="Calisto MT"/>
-            </a:endParaRPr>
-          </a:p>
-          <a:p>
-            <a:pPr marL="228600" indent="-228600" defTabSz="914400">
-              <a:lnSpc>
-                <a:spcPct val="110000"/>
-              </a:lnSpc>
-              <a:spcBef>
-                <a:spcPts val="1001"/>
-              </a:spcBef>
-              <a:buClr>
-                <a:srgbClr val="000000"/>
-              </a:buClr>
-              <a:buFont typeface="Symbol" charset="2"/>
-              <a:buChar char=""/>
-            </a:pPr>
-            <a:r>
-              <a:rPr lang="de-DE" sz="2000" b="0" u="none" strike="noStrike">
-                <a:solidFill>
-                  <a:schemeClr val="dk1"/>
-                </a:solidFill>
-                <a:effectLst/>
-                <a:uFillTx/>
-                <a:latin typeface="Calisto MT"/>
-              </a:rPr>
-              <a:t>Individuelles Passwort setzen</a:t>
-            </a:r>
-          </a:p>
-          <a:p>
-            <a:pPr marL="228600" indent="0" defTabSz="914400">
-              <a:lnSpc>
-                <a:spcPct val="110000"/>
-              </a:lnSpc>
-              <a:spcBef>
-                <a:spcPts val="1001"/>
-              </a:spcBef>
-              <a:buNone/>
-            </a:pPr>
-            <a:endParaRPr lang="de-DE" sz="2000" b="0" u="none" strike="noStrike">
-              <a:solidFill>
-                <a:schemeClr val="dk1"/>
-              </a:solidFill>
-              <a:effectLst/>
-              <a:uFillTx/>
-              <a:latin typeface="Calisto MT"/>
-            </a:endParaRPr>
-          </a:p>
-          <a:p>
-            <a:pPr marL="228600" indent="-228600" defTabSz="914400">
-              <a:lnSpc>
-                <a:spcPct val="110000"/>
-              </a:lnSpc>
-              <a:spcBef>
-                <a:spcPts val="1001"/>
-              </a:spcBef>
-              <a:buClr>
-                <a:srgbClr val="000000"/>
-              </a:buClr>
-              <a:buFont typeface="Symbol" charset="2"/>
-              <a:buChar char=""/>
-            </a:pPr>
-            <a:r>
-              <a:rPr lang="de-DE" sz="2000" b="0" u="none" strike="noStrike">
-                <a:solidFill>
-                  <a:schemeClr val="dk1"/>
-                </a:solidFill>
-                <a:effectLst/>
-                <a:uFillTx/>
-                <a:latin typeface="Calisto MT"/>
-              </a:rPr>
-              <a:t>Sprachwechsel</a:t>
-            </a:r>
-          </a:p>
-          <a:p>
-            <a:pPr marL="228600" indent="0" defTabSz="914400">
-              <a:lnSpc>
-                <a:spcPct val="110000"/>
-              </a:lnSpc>
-              <a:spcBef>
-                <a:spcPts val="1001"/>
-              </a:spcBef>
-              <a:buNone/>
-            </a:pPr>
-            <a:endParaRPr lang="de-DE" sz="2000" b="0" u="none" strike="noStrike">
-              <a:solidFill>
-                <a:schemeClr val="dk1"/>
-              </a:solidFill>
-              <a:effectLst/>
-              <a:uFillTx/>
-              <a:latin typeface="Calisto MT"/>
-            </a:endParaRPr>
-          </a:p>
-          <a:p>
-            <a:pPr marL="228600" indent="-228600" defTabSz="914400">
-              <a:lnSpc>
-                <a:spcPct val="110000"/>
-              </a:lnSpc>
-              <a:spcBef>
-                <a:spcPts val="1001"/>
-              </a:spcBef>
-              <a:buClr>
-                <a:srgbClr val="000000"/>
-              </a:buClr>
-              <a:buFont typeface="Symbol" charset="2"/>
-              <a:buChar char=""/>
-            </a:pPr>
-            <a:r>
-              <a:rPr lang="de-DE" sz="2000" b="0" u="none" strike="noStrike">
-                <a:solidFill>
-                  <a:schemeClr val="dk1"/>
-                </a:solidFill>
-                <a:effectLst/>
-                <a:uFillTx/>
-                <a:latin typeface="Calisto MT"/>
-              </a:rPr>
-              <a:t>Benachrichtigungen</a:t>
-            </a:r>
-          </a:p>
-          <a:p>
-            <a:pPr marL="228600" indent="0" defTabSz="914400">
-              <a:lnSpc>
-                <a:spcPct val="110000"/>
-              </a:lnSpc>
-              <a:spcBef>
-                <a:spcPts val="1001"/>
-              </a:spcBef>
-              <a:buNone/>
-            </a:pPr>
-            <a:endParaRPr lang="de-DE" sz="2000" b="0" u="none" strike="noStrike">
-              <a:solidFill>
-                <a:schemeClr val="dk1"/>
-              </a:solidFill>
-              <a:effectLst/>
-              <a:uFillTx/>
-              <a:latin typeface="Calisto MT"/>
-            </a:endParaRPr>
-          </a:p>
-          <a:p>
-            <a:pPr marL="228600" indent="-228600" defTabSz="914400">
-              <a:lnSpc>
-                <a:spcPct val="110000"/>
-              </a:lnSpc>
-              <a:spcBef>
-                <a:spcPts val="1001"/>
-              </a:spcBef>
-              <a:buClr>
-                <a:srgbClr val="000000"/>
-              </a:buClr>
-              <a:buFont typeface="Symbol" charset="2"/>
-              <a:buChar char=""/>
-            </a:pPr>
-            <a:r>
-              <a:rPr lang="de-DE" sz="2000" b="0" u="none" strike="noStrike">
-                <a:solidFill>
-                  <a:schemeClr val="dk1"/>
-                </a:solidFill>
-                <a:effectLst/>
-                <a:uFillTx/>
-                <a:latin typeface="Calisto MT"/>
-              </a:rPr>
-              <a:t>Logout</a:t>
-            </a:r>
-          </a:p>
-          <a:p>
-            <a:pPr marL="228600" indent="0" defTabSz="914400">
-              <a:lnSpc>
-                <a:spcPct val="110000"/>
-              </a:lnSpc>
-              <a:spcBef>
-                <a:spcPts val="1001"/>
-              </a:spcBef>
-              <a:buNone/>
-            </a:pPr>
-            <a:endParaRPr lang="de-DE" sz="2000" b="0" u="none" strike="noStrike">
-              <a:solidFill>
-                <a:schemeClr val="dk1"/>
-              </a:solidFill>
-              <a:effectLst/>
-              <a:uFillTx/>
-              <a:latin typeface="Calisto MT"/>
-            </a:endParaRPr>
-          </a:p>
-          <a:p>
-            <a:pPr marL="228600" indent="-228600" defTabSz="914400">
-              <a:lnSpc>
-                <a:spcPct val="110000"/>
-              </a:lnSpc>
-              <a:spcBef>
-                <a:spcPts val="1001"/>
-              </a:spcBef>
-              <a:buClr>
-                <a:srgbClr val="000000"/>
-              </a:buClr>
-              <a:buFont typeface="Symbol" charset="2"/>
-              <a:buChar char=""/>
-            </a:pPr>
-            <a:r>
-              <a:rPr lang="de-DE" sz="2000" b="0" u="none" strike="noStrike">
-                <a:solidFill>
-                  <a:schemeClr val="dk1"/>
-                </a:solidFill>
-                <a:effectLst/>
-                <a:uFillTx/>
-                <a:latin typeface="Calisto MT"/>
-              </a:rPr>
-              <a:t>Wochenübersicht</a:t>
-            </a:r>
-          </a:p>
-          <a:p>
-            <a:pPr marL="228600" indent="0" defTabSz="914400">
-              <a:lnSpc>
-                <a:spcPct val="110000"/>
-              </a:lnSpc>
-              <a:spcBef>
-                <a:spcPts val="1001"/>
-              </a:spcBef>
-              <a:buNone/>
-            </a:pPr>
-            <a:endParaRPr lang="de-DE" sz="2000" b="0" u="none" strike="noStrike">
-              <a:solidFill>
-                <a:schemeClr val="dk1"/>
-              </a:solidFill>
-              <a:effectLst/>
-              <a:uFillTx/>
-              <a:latin typeface="Calisto MT"/>
-            </a:endParaRPr>
-          </a:p>
-          <a:p>
-            <a:pPr marL="228600" indent="-228600" defTabSz="914400">
-              <a:lnSpc>
-                <a:spcPct val="110000"/>
-              </a:lnSpc>
-              <a:spcBef>
-                <a:spcPts val="1001"/>
-              </a:spcBef>
-              <a:buClr>
-                <a:srgbClr val="000000"/>
-              </a:buClr>
-              <a:buFont typeface="Symbol" charset="2"/>
-              <a:buChar char=""/>
-            </a:pPr>
-            <a:r>
-              <a:rPr lang="de-DE" sz="2000" b="0" u="none" strike="noStrike">
-                <a:solidFill>
-                  <a:schemeClr val="dk1"/>
-                </a:solidFill>
-                <a:effectLst/>
-                <a:uFillTx/>
-                <a:latin typeface="Calisto MT"/>
-              </a:rPr>
-              <a:t>Kommen/ Gehen</a:t>
-            </a:r>
-          </a:p>
-          <a:p>
-            <a:pPr marL="228600" indent="0" defTabSz="914400">
-              <a:lnSpc>
-                <a:spcPct val="110000"/>
-              </a:lnSpc>
-              <a:spcBef>
-                <a:spcPts val="1001"/>
-              </a:spcBef>
-              <a:buNone/>
-            </a:pPr>
-            <a:endParaRPr lang="de-DE" sz="2000" b="0" u="none" strike="noStrike">
-              <a:solidFill>
-                <a:schemeClr val="dk1"/>
-              </a:solidFill>
-              <a:effectLst/>
-              <a:uFillTx/>
-              <a:latin typeface="Calisto MT"/>
-            </a:endParaRPr>
-          </a:p>
-          <a:p>
-            <a:pPr marL="228600" indent="-228600" defTabSz="914400">
-              <a:lnSpc>
-                <a:spcPct val="110000"/>
-              </a:lnSpc>
-              <a:spcBef>
-                <a:spcPts val="1001"/>
-              </a:spcBef>
-              <a:buClr>
-                <a:srgbClr val="000000"/>
-              </a:buClr>
-              <a:buFont typeface="Symbol" charset="2"/>
-              <a:buChar char=""/>
-            </a:pPr>
-            <a:r>
-              <a:rPr lang="de-DE" sz="2000" b="0" u="none" strike="noStrike">
-                <a:solidFill>
-                  <a:schemeClr val="dk1"/>
-                </a:solidFill>
-                <a:effectLst/>
-                <a:uFillTx/>
-                <a:latin typeface="Calisto MT"/>
-              </a:rPr>
-              <a:t>Benutzer mit Arbeitszeit</a:t>
-            </a:r>
-          </a:p>
-          <a:p>
-            <a:pPr indent="0" defTabSz="914400">
-              <a:lnSpc>
-                <a:spcPct val="110000"/>
-              </a:lnSpc>
-              <a:spcBef>
-                <a:spcPts val="1001"/>
-              </a:spcBef>
-              <a:buNone/>
-            </a:pPr>
-            <a:endParaRPr lang="de-DE" sz="2000" b="0" u="none" strike="noStrike">
-              <a:solidFill>
-                <a:schemeClr val="dk1"/>
-              </a:solidFill>
-              <a:effectLst/>
-              <a:uFillTx/>
-              <a:latin typeface="Calisto MT"/>
-            </a:endParaRPr>
-          </a:p>
-          <a:p>
-            <a:pPr indent="0" defTabSz="914400">
-              <a:lnSpc>
-                <a:spcPct val="110000"/>
-              </a:lnSpc>
-              <a:spcBef>
-                <a:spcPts val="1001"/>
-              </a:spcBef>
-              <a:buNone/>
-            </a:pPr>
-            <a:endParaRPr lang="de-DE" sz="2000" b="0" u="none" strike="noStrike">
-              <a:solidFill>
-                <a:schemeClr val="dk1"/>
-              </a:solidFill>
-              <a:effectLst/>
-              <a:uFillTx/>
-              <a:latin typeface="Calisto MT"/>
-            </a:endParaRPr>
           </a:p>
           <a:p>
             <a:pPr indent="0" defTabSz="914400">
@@ -16927,6 +18952,610 @@
 <file path=ppt/slides/slide20.xml><?xml version="1.0" encoding="utf-8"?>
 <p:sld xmlns:a="http://schemas.openxmlformats.org/drawingml/2006/main" xmlns:r="http://schemas.openxmlformats.org/officeDocument/2006/relationships" xmlns:p="http://schemas.openxmlformats.org/presentationml/2006/main">
   <p:cSld>
+    <p:bg>
+      <p:bgPr>
+        <a:solidFill>
+          <a:schemeClr val="lt1"/>
+        </a:solidFill>
+        <a:effectLst/>
+      </p:bgPr>
+    </p:bg>
+    <p:spTree>
+      <p:nvGrpSpPr>
+        <p:cNvPr id="1" name=""/>
+        <p:cNvGrpSpPr/>
+        <p:nvPr/>
+      </p:nvGrpSpPr>
+      <p:grpSpPr>
+        <a:xfrm>
+          <a:off x="0" y="0"/>
+          <a:ext cx="0" cy="0"/>
+          <a:chOff x="0" y="0"/>
+          <a:chExt cx="0" cy="0"/>
+        </a:xfrm>
+      </p:grpSpPr>
+      <p:sp useBgFill="1">
+        <p:nvSpPr>
+          <p:cNvPr id="157" name="Rectangle 9">
+            <a:extLst>
+              <a:ext uri="{C183D7F6-B498-43B3-948B-1728B52AA6E4}">
+                <adec:decorative xmlns:adec="http://schemas.microsoft.com/office/drawing/2017/decorative" val="1"/>
+              </a:ext>
+            </a:extLst>
+          </p:cNvPr>
+          <p:cNvSpPr/>
+          <p:nvPr/>
+        </p:nvSpPr>
+        <p:spPr>
+          <a:xfrm>
+            <a:off x="0" y="0"/>
+            <a:ext cx="12191760" cy="6857640"/>
+          </a:xfrm>
+          <a:prstGeom prst="rect">
+            <a:avLst/>
+          </a:prstGeom>
+          <a:ln>
+            <a:noFill/>
+          </a:ln>
+        </p:spPr>
+        <p:style>
+          <a:lnRef idx="2">
+            <a:schemeClr val="accent1">
+              <a:shade val="50000"/>
+            </a:schemeClr>
+          </a:lnRef>
+          <a:fillRef idx="1">
+            <a:schemeClr val="accent1"/>
+          </a:fillRef>
+          <a:effectRef idx="0">
+            <a:schemeClr val="accent1"/>
+          </a:effectRef>
+          <a:fontRef idx="minor"/>
+        </p:style>
+        <p:txBody>
+          <a:bodyPr lIns="90000" tIns="45000" rIns="90000" bIns="45000" anchor="ctr">
+            <a:noAutofit/>
+          </a:bodyPr>
+          <a:lstStyle/>
+          <a:p>
+            <a:endParaRPr lang="en-US" sz="1800" b="0" u="none" strike="noStrike">
+              <a:solidFill>
+                <a:schemeClr val="lt1"/>
+              </a:solidFill>
+              <a:effectLst/>
+              <a:uFillTx/>
+              <a:latin typeface="Calisto MT"/>
+            </a:endParaRPr>
+          </a:p>
+        </p:txBody>
+      </p:sp>
+      <p:sp>
+        <p:nvSpPr>
+          <p:cNvPr id="158" name="PlaceHolder 1"/>
+          <p:cNvSpPr>
+            <a:spLocks noGrp="1"/>
+          </p:cNvSpPr>
+          <p:nvPr>
+            <p:ph type="title"/>
+          </p:nvPr>
+        </p:nvSpPr>
+        <p:spPr>
+          <a:xfrm>
+            <a:off x="704160" y="555840"/>
+            <a:ext cx="10815840" cy="2390400"/>
+          </a:xfrm>
+          <a:prstGeom prst="rect">
+            <a:avLst/>
+          </a:prstGeom>
+          <a:noFill/>
+          <a:ln w="0">
+            <a:noFill/>
+          </a:ln>
+        </p:spPr>
+        <p:txBody>
+          <a:bodyPr lIns="91440" tIns="45720" rIns="91440" bIns="45720" anchor="t">
+            <a:normAutofit/>
+          </a:bodyPr>
+          <a:lstStyle/>
+          <a:p>
+            <a:pPr indent="0" defTabSz="914400">
+              <a:lnSpc>
+                <a:spcPct val="100000"/>
+              </a:lnSpc>
+              <a:buNone/>
+            </a:pPr>
+            <a:r>
+              <a:rPr lang="de-DE" sz="4000" b="0" u="none" strike="noStrike" cap="all" spc="31" dirty="0">
+                <a:solidFill>
+                  <a:schemeClr val="dk1"/>
+                </a:solidFill>
+                <a:effectLst/>
+                <a:uFillTx/>
+                <a:latin typeface="Univers Condensed"/>
+              </a:rPr>
+              <a:t>8. Live Demo – User Dashboard</a:t>
+            </a:r>
+            <a:endParaRPr lang="de-DE" sz="4000" b="0" u="none" strike="noStrike" dirty="0">
+              <a:solidFill>
+                <a:schemeClr val="dk1"/>
+              </a:solidFill>
+              <a:effectLst/>
+              <a:uFillTx/>
+              <a:latin typeface="Calisto MT"/>
+            </a:endParaRPr>
+          </a:p>
+        </p:txBody>
+      </p:sp>
+      <p:sp>
+        <p:nvSpPr>
+          <p:cNvPr id="159" name="PlaceHolder 2"/>
+          <p:cNvSpPr>
+            <a:spLocks noGrp="1"/>
+          </p:cNvSpPr>
+          <p:nvPr>
+            <p:ph/>
+          </p:nvPr>
+        </p:nvSpPr>
+        <p:spPr>
+          <a:xfrm>
+            <a:off x="720000" y="1440000"/>
+            <a:ext cx="10772280" cy="4730040"/>
+          </a:xfrm>
+          <a:prstGeom prst="rect">
+            <a:avLst/>
+          </a:prstGeom>
+          <a:noFill/>
+          <a:ln w="0">
+            <a:noFill/>
+          </a:ln>
+        </p:spPr>
+        <p:txBody>
+          <a:bodyPr lIns="91440" tIns="45720" rIns="91440" bIns="45720" anchor="t">
+            <a:normAutofit fontScale="70000" lnSpcReduction="20000"/>
+          </a:bodyPr>
+          <a:lstStyle/>
+          <a:p>
+            <a:pPr marL="228600" indent="0" defTabSz="914400">
+              <a:lnSpc>
+                <a:spcPct val="110000"/>
+              </a:lnSpc>
+              <a:spcBef>
+                <a:spcPts val="1001"/>
+              </a:spcBef>
+              <a:buNone/>
+            </a:pPr>
+            <a:endParaRPr lang="de-DE" sz="2000" b="0" u="none" strike="noStrike">
+              <a:solidFill>
+                <a:schemeClr val="dk1"/>
+              </a:solidFill>
+              <a:effectLst/>
+              <a:uFillTx/>
+              <a:latin typeface="Calisto MT"/>
+            </a:endParaRPr>
+          </a:p>
+          <a:p>
+            <a:pPr marL="228600" indent="-228600" defTabSz="914400">
+              <a:lnSpc>
+                <a:spcPct val="110000"/>
+              </a:lnSpc>
+              <a:spcBef>
+                <a:spcPts val="1001"/>
+              </a:spcBef>
+              <a:buClr>
+                <a:srgbClr val="000000"/>
+              </a:buClr>
+              <a:buFont typeface="Symbol" charset="2"/>
+              <a:buChar char=""/>
+            </a:pPr>
+            <a:r>
+              <a:rPr lang="de-DE" sz="2000" b="0" u="none" strike="noStrike">
+                <a:solidFill>
+                  <a:schemeClr val="dk1"/>
+                </a:solidFill>
+                <a:effectLst/>
+                <a:uFillTx/>
+                <a:latin typeface="Calisto MT"/>
+              </a:rPr>
+              <a:t>Individuelles Passwort setzen</a:t>
+            </a:r>
+          </a:p>
+          <a:p>
+            <a:pPr marL="228600" indent="0" defTabSz="914400">
+              <a:lnSpc>
+                <a:spcPct val="110000"/>
+              </a:lnSpc>
+              <a:spcBef>
+                <a:spcPts val="1001"/>
+              </a:spcBef>
+              <a:buNone/>
+            </a:pPr>
+            <a:endParaRPr lang="de-DE" sz="2000" b="0" u="none" strike="noStrike">
+              <a:solidFill>
+                <a:schemeClr val="dk1"/>
+              </a:solidFill>
+              <a:effectLst/>
+              <a:uFillTx/>
+              <a:latin typeface="Calisto MT"/>
+            </a:endParaRPr>
+          </a:p>
+          <a:p>
+            <a:pPr marL="228600" indent="-228600" defTabSz="914400">
+              <a:lnSpc>
+                <a:spcPct val="110000"/>
+              </a:lnSpc>
+              <a:spcBef>
+                <a:spcPts val="1001"/>
+              </a:spcBef>
+              <a:buClr>
+                <a:srgbClr val="000000"/>
+              </a:buClr>
+              <a:buFont typeface="Symbol" charset="2"/>
+              <a:buChar char=""/>
+            </a:pPr>
+            <a:r>
+              <a:rPr lang="de-DE" sz="2000" b="0" u="none" strike="noStrike">
+                <a:solidFill>
+                  <a:schemeClr val="dk1"/>
+                </a:solidFill>
+                <a:effectLst/>
+                <a:uFillTx/>
+                <a:latin typeface="Calisto MT"/>
+              </a:rPr>
+              <a:t>Sprachwechsel</a:t>
+            </a:r>
+          </a:p>
+          <a:p>
+            <a:pPr marL="228600" indent="0" defTabSz="914400">
+              <a:lnSpc>
+                <a:spcPct val="110000"/>
+              </a:lnSpc>
+              <a:spcBef>
+                <a:spcPts val="1001"/>
+              </a:spcBef>
+              <a:buNone/>
+            </a:pPr>
+            <a:endParaRPr lang="de-DE" sz="2000" b="0" u="none" strike="noStrike">
+              <a:solidFill>
+                <a:schemeClr val="dk1"/>
+              </a:solidFill>
+              <a:effectLst/>
+              <a:uFillTx/>
+              <a:latin typeface="Calisto MT"/>
+            </a:endParaRPr>
+          </a:p>
+          <a:p>
+            <a:pPr marL="228600" indent="-228600" defTabSz="914400">
+              <a:lnSpc>
+                <a:spcPct val="110000"/>
+              </a:lnSpc>
+              <a:spcBef>
+                <a:spcPts val="1001"/>
+              </a:spcBef>
+              <a:buClr>
+                <a:srgbClr val="000000"/>
+              </a:buClr>
+              <a:buFont typeface="Symbol" charset="2"/>
+              <a:buChar char=""/>
+            </a:pPr>
+            <a:r>
+              <a:rPr lang="de-DE" sz="2000" b="0" u="none" strike="noStrike">
+                <a:solidFill>
+                  <a:schemeClr val="dk1"/>
+                </a:solidFill>
+                <a:effectLst/>
+                <a:uFillTx/>
+                <a:latin typeface="Calisto MT"/>
+              </a:rPr>
+              <a:t>Benachrichtigungen</a:t>
+            </a:r>
+          </a:p>
+          <a:p>
+            <a:pPr marL="228600" indent="0" defTabSz="914400">
+              <a:lnSpc>
+                <a:spcPct val="110000"/>
+              </a:lnSpc>
+              <a:spcBef>
+                <a:spcPts val="1001"/>
+              </a:spcBef>
+              <a:buNone/>
+            </a:pPr>
+            <a:endParaRPr lang="de-DE" sz="2000" b="0" u="none" strike="noStrike">
+              <a:solidFill>
+                <a:schemeClr val="dk1"/>
+              </a:solidFill>
+              <a:effectLst/>
+              <a:uFillTx/>
+              <a:latin typeface="Calisto MT"/>
+            </a:endParaRPr>
+          </a:p>
+          <a:p>
+            <a:pPr marL="228600" indent="-228600" defTabSz="914400">
+              <a:lnSpc>
+                <a:spcPct val="110000"/>
+              </a:lnSpc>
+              <a:spcBef>
+                <a:spcPts val="1001"/>
+              </a:spcBef>
+              <a:buClr>
+                <a:srgbClr val="000000"/>
+              </a:buClr>
+              <a:buFont typeface="Symbol" charset="2"/>
+              <a:buChar char=""/>
+            </a:pPr>
+            <a:r>
+              <a:rPr lang="de-DE" sz="2000" b="0" u="none" strike="noStrike">
+                <a:solidFill>
+                  <a:schemeClr val="dk1"/>
+                </a:solidFill>
+                <a:effectLst/>
+                <a:uFillTx/>
+                <a:latin typeface="Calisto MT"/>
+              </a:rPr>
+              <a:t>Logout</a:t>
+            </a:r>
+          </a:p>
+          <a:p>
+            <a:pPr marL="228600" indent="0" defTabSz="914400">
+              <a:lnSpc>
+                <a:spcPct val="110000"/>
+              </a:lnSpc>
+              <a:spcBef>
+                <a:spcPts val="1001"/>
+              </a:spcBef>
+              <a:buNone/>
+            </a:pPr>
+            <a:endParaRPr lang="de-DE" sz="2000" b="0" u="none" strike="noStrike">
+              <a:solidFill>
+                <a:schemeClr val="dk1"/>
+              </a:solidFill>
+              <a:effectLst/>
+              <a:uFillTx/>
+              <a:latin typeface="Calisto MT"/>
+            </a:endParaRPr>
+          </a:p>
+          <a:p>
+            <a:pPr marL="228600" indent="-228600" defTabSz="914400">
+              <a:lnSpc>
+                <a:spcPct val="110000"/>
+              </a:lnSpc>
+              <a:spcBef>
+                <a:spcPts val="1001"/>
+              </a:spcBef>
+              <a:buClr>
+                <a:srgbClr val="000000"/>
+              </a:buClr>
+              <a:buFont typeface="Symbol" charset="2"/>
+              <a:buChar char=""/>
+            </a:pPr>
+            <a:r>
+              <a:rPr lang="de-DE" sz="2000" b="0" u="none" strike="noStrike">
+                <a:solidFill>
+                  <a:schemeClr val="dk1"/>
+                </a:solidFill>
+                <a:effectLst/>
+                <a:uFillTx/>
+                <a:latin typeface="Calisto MT"/>
+              </a:rPr>
+              <a:t>Wochenübersicht</a:t>
+            </a:r>
+          </a:p>
+          <a:p>
+            <a:pPr marL="228600" indent="0" defTabSz="914400">
+              <a:lnSpc>
+                <a:spcPct val="110000"/>
+              </a:lnSpc>
+              <a:spcBef>
+                <a:spcPts val="1001"/>
+              </a:spcBef>
+              <a:buNone/>
+            </a:pPr>
+            <a:endParaRPr lang="de-DE" sz="2000" b="0" u="none" strike="noStrike">
+              <a:solidFill>
+                <a:schemeClr val="dk1"/>
+              </a:solidFill>
+              <a:effectLst/>
+              <a:uFillTx/>
+              <a:latin typeface="Calisto MT"/>
+            </a:endParaRPr>
+          </a:p>
+          <a:p>
+            <a:pPr marL="228600" indent="-228600" defTabSz="914400">
+              <a:lnSpc>
+                <a:spcPct val="110000"/>
+              </a:lnSpc>
+              <a:spcBef>
+                <a:spcPts val="1001"/>
+              </a:spcBef>
+              <a:buClr>
+                <a:srgbClr val="000000"/>
+              </a:buClr>
+              <a:buFont typeface="Symbol" charset="2"/>
+              <a:buChar char=""/>
+            </a:pPr>
+            <a:r>
+              <a:rPr lang="de-DE" sz="2000" b="0" u="none" strike="noStrike">
+                <a:solidFill>
+                  <a:schemeClr val="dk1"/>
+                </a:solidFill>
+                <a:effectLst/>
+                <a:uFillTx/>
+                <a:latin typeface="Calisto MT"/>
+              </a:rPr>
+              <a:t>Kommen/ Gehen</a:t>
+            </a:r>
+          </a:p>
+          <a:p>
+            <a:pPr marL="228600" indent="0" defTabSz="914400">
+              <a:lnSpc>
+                <a:spcPct val="110000"/>
+              </a:lnSpc>
+              <a:spcBef>
+                <a:spcPts val="1001"/>
+              </a:spcBef>
+              <a:buNone/>
+            </a:pPr>
+            <a:endParaRPr lang="de-DE" sz="2000" b="0" u="none" strike="noStrike">
+              <a:solidFill>
+                <a:schemeClr val="dk1"/>
+              </a:solidFill>
+              <a:effectLst/>
+              <a:uFillTx/>
+              <a:latin typeface="Calisto MT"/>
+            </a:endParaRPr>
+          </a:p>
+          <a:p>
+            <a:pPr marL="228600" indent="-228600" defTabSz="914400">
+              <a:lnSpc>
+                <a:spcPct val="110000"/>
+              </a:lnSpc>
+              <a:spcBef>
+                <a:spcPts val="1001"/>
+              </a:spcBef>
+              <a:buClr>
+                <a:srgbClr val="000000"/>
+              </a:buClr>
+              <a:buFont typeface="Symbol" charset="2"/>
+              <a:buChar char=""/>
+            </a:pPr>
+            <a:r>
+              <a:rPr lang="de-DE" sz="2000" b="0" u="none" strike="noStrike">
+                <a:solidFill>
+                  <a:schemeClr val="dk1"/>
+                </a:solidFill>
+                <a:effectLst/>
+                <a:uFillTx/>
+                <a:latin typeface="Calisto MT"/>
+              </a:rPr>
+              <a:t>Benutzer mit Arbeitszeit</a:t>
+            </a:r>
+          </a:p>
+          <a:p>
+            <a:pPr indent="0" defTabSz="914400">
+              <a:lnSpc>
+                <a:spcPct val="110000"/>
+              </a:lnSpc>
+              <a:spcBef>
+                <a:spcPts val="1001"/>
+              </a:spcBef>
+              <a:buNone/>
+            </a:pPr>
+            <a:endParaRPr lang="de-DE" sz="2000" b="0" u="none" strike="noStrike">
+              <a:solidFill>
+                <a:schemeClr val="dk1"/>
+              </a:solidFill>
+              <a:effectLst/>
+              <a:uFillTx/>
+              <a:latin typeface="Calisto MT"/>
+            </a:endParaRPr>
+          </a:p>
+          <a:p>
+            <a:pPr indent="0" defTabSz="914400">
+              <a:lnSpc>
+                <a:spcPct val="110000"/>
+              </a:lnSpc>
+              <a:spcBef>
+                <a:spcPts val="1001"/>
+              </a:spcBef>
+              <a:buNone/>
+            </a:pPr>
+            <a:endParaRPr lang="de-DE" sz="2000" b="0" u="none" strike="noStrike">
+              <a:solidFill>
+                <a:schemeClr val="dk1"/>
+              </a:solidFill>
+              <a:effectLst/>
+              <a:uFillTx/>
+              <a:latin typeface="Calisto MT"/>
+            </a:endParaRPr>
+          </a:p>
+          <a:p>
+            <a:pPr indent="0" defTabSz="914400">
+              <a:lnSpc>
+                <a:spcPct val="110000"/>
+              </a:lnSpc>
+              <a:spcBef>
+                <a:spcPts val="1001"/>
+              </a:spcBef>
+              <a:buNone/>
+            </a:pPr>
+            <a:endParaRPr lang="de-DE" sz="2000" b="0" u="none" strike="noStrike">
+              <a:solidFill>
+                <a:schemeClr val="dk1"/>
+              </a:solidFill>
+              <a:effectLst/>
+              <a:uFillTx/>
+              <a:latin typeface="Calisto MT"/>
+            </a:endParaRPr>
+          </a:p>
+          <a:p>
+            <a:pPr indent="0" defTabSz="914400">
+              <a:lnSpc>
+                <a:spcPct val="110000"/>
+              </a:lnSpc>
+              <a:spcBef>
+                <a:spcPts val="1001"/>
+              </a:spcBef>
+              <a:buNone/>
+            </a:pPr>
+            <a:endParaRPr lang="de-DE" sz="2000" b="0" u="none" strike="noStrike">
+              <a:solidFill>
+                <a:schemeClr val="dk1"/>
+              </a:solidFill>
+              <a:effectLst/>
+              <a:uFillTx/>
+              <a:latin typeface="Calisto MT"/>
+            </a:endParaRPr>
+          </a:p>
+          <a:p>
+            <a:pPr indent="0" defTabSz="914400">
+              <a:lnSpc>
+                <a:spcPct val="110000"/>
+              </a:lnSpc>
+              <a:spcBef>
+                <a:spcPts val="1001"/>
+              </a:spcBef>
+              <a:buNone/>
+            </a:pPr>
+            <a:endParaRPr lang="de-DE" sz="2000" b="0" u="none" strike="noStrike">
+              <a:solidFill>
+                <a:schemeClr val="dk1"/>
+              </a:solidFill>
+              <a:effectLst/>
+              <a:uFillTx/>
+              <a:latin typeface="Calisto MT"/>
+            </a:endParaRPr>
+          </a:p>
+          <a:p>
+            <a:pPr indent="0" defTabSz="914400">
+              <a:lnSpc>
+                <a:spcPct val="110000"/>
+              </a:lnSpc>
+              <a:spcBef>
+                <a:spcPts val="1001"/>
+              </a:spcBef>
+              <a:buNone/>
+            </a:pPr>
+            <a:endParaRPr lang="de-DE" sz="2000" b="0" u="none" strike="noStrike">
+              <a:solidFill>
+                <a:schemeClr val="dk1"/>
+              </a:solidFill>
+              <a:effectLst/>
+              <a:uFillTx/>
+              <a:latin typeface="Calisto MT"/>
+            </a:endParaRPr>
+          </a:p>
+        </p:txBody>
+      </p:sp>
+    </p:spTree>
+  </p:cSld>
+  <p:clrMapOvr>
+    <a:masterClrMapping/>
+  </p:clrMapOvr>
+</p:sld>
+</file>
+
+<file path=ppt/slides/slide21.xml><?xml version="1.0" encoding="utf-8"?>
+<p:sld xmlns:a="http://schemas.openxmlformats.org/drawingml/2006/main" xmlns:r="http://schemas.openxmlformats.org/officeDocument/2006/relationships" xmlns:p="http://schemas.openxmlformats.org/presentationml/2006/main">
+  <p:cSld>
     <p:spTree>
       <p:nvGrpSpPr>
         <p:cNvPr id="1" name=""/>
@@ -17080,7 +19709,7 @@
 </p:sld>
 </file>
 
-<file path=ppt/slides/slide21.xml><?xml version="1.0" encoding="utf-8"?>
+<file path=ppt/slides/slide22.xml><?xml version="1.0" encoding="utf-8"?>
 <p:sld xmlns:a="http://schemas.openxmlformats.org/drawingml/2006/main" xmlns:r="http://schemas.openxmlformats.org/officeDocument/2006/relationships" xmlns:p="http://schemas.openxmlformats.org/presentationml/2006/main">
   <p:cSld>
     <p:bg>
@@ -17488,7 +20117,7 @@
 </p:sld>
 </file>
 
-<file path=ppt/slides/slide22.xml><?xml version="1.0" encoding="utf-8"?>
+<file path=ppt/slides/slide23.xml><?xml version="1.0" encoding="utf-8"?>
 <p:sld xmlns:a="http://schemas.openxmlformats.org/drawingml/2006/main" xmlns:r="http://schemas.openxmlformats.org/officeDocument/2006/relationships" xmlns:p="http://schemas.openxmlformats.org/presentationml/2006/main">
   <p:cSld>
     <p:bg>
@@ -17867,7 +20496,7 @@
 </p:sld>
 </file>
 
-<file path=ppt/slides/slide23.xml><?xml version="1.0" encoding="utf-8"?>
+<file path=ppt/slides/slide24.xml><?xml version="1.0" encoding="utf-8"?>
 <p:sld xmlns:a="http://schemas.openxmlformats.org/drawingml/2006/main" xmlns:r="http://schemas.openxmlformats.org/officeDocument/2006/relationships" xmlns:p="http://schemas.openxmlformats.org/presentationml/2006/main">
   <p:cSld>
     <p:bg>
@@ -18164,7 +20793,7 @@
 </p:sld>
 </file>
 
-<file path=ppt/slides/slide24.xml><?xml version="1.0" encoding="utf-8"?>
+<file path=ppt/slides/slide25.xml><?xml version="1.0" encoding="utf-8"?>
 <p:sld xmlns:a="http://schemas.openxmlformats.org/drawingml/2006/main" xmlns:r="http://schemas.openxmlformats.org/officeDocument/2006/relationships" xmlns:p="http://schemas.openxmlformats.org/presentationml/2006/main">
   <p:cSld>
     <p:bg>
@@ -23634,38 +26263,6 @@
           </a:p>
         </p:txBody>
       </p:sp>
-      <p:sp>
-        <p:nvSpPr>
-          <p:cNvPr id="14" name="Textfeld 13">
-            <a:extLst>
-              <a:ext uri="{FF2B5EF4-FFF2-40B4-BE49-F238E27FC236}">
-                <a16:creationId xmlns:a16="http://schemas.microsoft.com/office/drawing/2014/main" id="{6009AD51-3CAD-2A5E-8D0C-590143EC6C98}"/>
-              </a:ext>
-            </a:extLst>
-          </p:cNvPr>
-          <p:cNvSpPr txBox="1"/>
-          <p:nvPr/>
-        </p:nvSpPr>
-        <p:spPr>
-          <a:xfrm>
-            <a:off x="11454063" y="-1828800"/>
-            <a:ext cx="184731" cy="369332"/>
-          </a:xfrm>
-          <a:prstGeom prst="rect">
-            <a:avLst/>
-          </a:prstGeom>
-          <a:noFill/>
-        </p:spPr>
-        <p:txBody>
-          <a:bodyPr wrap="none" rtlCol="0">
-            <a:spAutoFit/>
-          </a:bodyPr>
-          <a:lstStyle/>
-          <a:p>
-            <a:endParaRPr lang="de-DE" dirty="0"/>
-          </a:p>
-        </p:txBody>
-      </p:sp>
     </p:spTree>
     <p:extLst>
       <p:ext uri="{BB962C8B-B14F-4D97-AF65-F5344CB8AC3E}">

</xml_diff>